<commit_message>
update date for 17.10.8
</commit_message>
<xml_diff>
--- a/share/提摩太后书/释经讲道01-属灵生命成长的秘诀/属灵生命成长的秘诀-2ti2-1-14.pptx
+++ b/share/提摩太后书/释经讲道01-属灵生命成长的秘诀/属灵生命成长的秘诀-2ti2-1-14.pptx
@@ -202,14 +202,14 @@
           <a:effectLst/>
           <a:extLst>
             <a:ext uri="{909E8E84-426E-40DD-AFC4-6F175D3DCCD1}">
-              <a14:hiddenFill xmlns:a14="http://schemas.microsoft.com/office/drawing/2010/main" xmlns="">
+              <a14:hiddenFill xmlns="" xmlns:a14="http://schemas.microsoft.com/office/drawing/2010/main">
                 <a:solidFill>
                   <a:schemeClr val="accent1"/>
                 </a:solidFill>
               </a14:hiddenFill>
             </a:ext>
             <a:ext uri="{91240B29-F687-4F45-9708-019B960494DF}">
-              <a14:hiddenLine xmlns:a14="http://schemas.microsoft.com/office/drawing/2010/main" xmlns="" w="9525">
+              <a14:hiddenLine xmlns="" xmlns:a14="http://schemas.microsoft.com/office/drawing/2010/main" w="9525">
                 <a:solidFill>
                   <a:schemeClr val="tx1"/>
                 </a:solidFill>
@@ -219,7 +219,7 @@
               </a14:hiddenLine>
             </a:ext>
             <a:ext uri="{AF507438-7753-43E0-B8FC-AC1667EBCBE1}">
-              <a14:hiddenEffects xmlns:a14="http://schemas.microsoft.com/office/drawing/2010/main" xmlns="">
+              <a14:hiddenEffects xmlns="" xmlns:a14="http://schemas.microsoft.com/office/drawing/2010/main">
                 <a:effectLst>
                   <a:outerShdw dist="35921" dir="2700000" algn="ctr" rotWithShape="0">
                     <a:schemeClr val="bg2"/>
@@ -270,14 +270,14 @@
           <a:effectLst/>
           <a:extLst>
             <a:ext uri="{909E8E84-426E-40DD-AFC4-6F175D3DCCD1}">
-              <a14:hiddenFill xmlns:a14="http://schemas.microsoft.com/office/drawing/2010/main" xmlns="">
+              <a14:hiddenFill xmlns="" xmlns:a14="http://schemas.microsoft.com/office/drawing/2010/main">
                 <a:solidFill>
                   <a:schemeClr val="accent1"/>
                 </a:solidFill>
               </a14:hiddenFill>
             </a:ext>
             <a:ext uri="{91240B29-F687-4F45-9708-019B960494DF}">
-              <a14:hiddenLine xmlns:a14="http://schemas.microsoft.com/office/drawing/2010/main" xmlns="" w="9525">
+              <a14:hiddenLine xmlns="" xmlns:a14="http://schemas.microsoft.com/office/drawing/2010/main" w="9525">
                 <a:solidFill>
                   <a:schemeClr val="tx1"/>
                 </a:solidFill>
@@ -287,7 +287,7 @@
               </a14:hiddenLine>
             </a:ext>
             <a:ext uri="{AF507438-7753-43E0-B8FC-AC1667EBCBE1}">
-              <a14:hiddenEffects xmlns:a14="http://schemas.microsoft.com/office/drawing/2010/main" xmlns="">
+              <a14:hiddenEffects xmlns="" xmlns:a14="http://schemas.microsoft.com/office/drawing/2010/main">
                 <a:effectLst>
                   <a:outerShdw dist="35921" dir="2700000" algn="ctr" rotWithShape="0">
                     <a:schemeClr val="bg2"/>
@@ -343,7 +343,7 @@
           <a:effectLst/>
           <a:extLst>
             <a:ext uri="{AF507438-7753-43E0-B8FC-AC1667EBCBE1}">
-              <a14:hiddenEffects xmlns:a14="http://schemas.microsoft.com/office/drawing/2010/main" xmlns="">
+              <a14:hiddenEffects xmlns="" xmlns:a14="http://schemas.microsoft.com/office/drawing/2010/main">
                 <a:effectLst>
                   <a:outerShdw dist="35921" dir="2700000" algn="ctr" rotWithShape="0">
                     <a:srgbClr val="808080"/>
@@ -352,7 +352,7 @@
               </a14:hiddenEffects>
             </a:ext>
             <a:ext uri="{53640926-AAD7-44D8-BBD7-CCE9431645EC}">
-              <a14:shadowObscured xmlns:a14="http://schemas.microsoft.com/office/drawing/2010/main" xmlns="" val="1"/>
+              <a14:shadowObscured xmlns="" xmlns:a14="http://schemas.microsoft.com/office/drawing/2010/main" val="1"/>
             </a:ext>
           </a:extLst>
         </p:spPr>
@@ -382,14 +382,14 @@
           <a:effectLst/>
           <a:extLst>
             <a:ext uri="{909E8E84-426E-40DD-AFC4-6F175D3DCCD1}">
-              <a14:hiddenFill xmlns:a14="http://schemas.microsoft.com/office/drawing/2010/main" xmlns="">
+              <a14:hiddenFill xmlns="" xmlns:a14="http://schemas.microsoft.com/office/drawing/2010/main">
                 <a:solidFill>
                   <a:schemeClr val="accent1"/>
                 </a:solidFill>
               </a14:hiddenFill>
             </a:ext>
             <a:ext uri="{91240B29-F687-4F45-9708-019B960494DF}">
-              <a14:hiddenLine xmlns:a14="http://schemas.microsoft.com/office/drawing/2010/main" xmlns="" w="9525">
+              <a14:hiddenLine xmlns="" xmlns:a14="http://schemas.microsoft.com/office/drawing/2010/main" w="9525">
                 <a:solidFill>
                   <a:schemeClr val="tx1"/>
                 </a:solidFill>
@@ -399,7 +399,7 @@
               </a14:hiddenLine>
             </a:ext>
             <a:ext uri="{AF507438-7753-43E0-B8FC-AC1667EBCBE1}">
-              <a14:hiddenEffects xmlns:a14="http://schemas.microsoft.com/office/drawing/2010/main" xmlns="">
+              <a14:hiddenEffects xmlns="" xmlns:a14="http://schemas.microsoft.com/office/drawing/2010/main">
                 <a:effectLst>
                   <a:outerShdw dist="35921" dir="2700000" algn="ctr" rotWithShape="0">
                     <a:schemeClr val="bg2"/>
@@ -478,14 +478,14 @@
           <a:effectLst/>
           <a:extLst>
             <a:ext uri="{909E8E84-426E-40DD-AFC4-6F175D3DCCD1}">
-              <a14:hiddenFill xmlns:a14="http://schemas.microsoft.com/office/drawing/2010/main" xmlns="">
+              <a14:hiddenFill xmlns="" xmlns:a14="http://schemas.microsoft.com/office/drawing/2010/main">
                 <a:solidFill>
                   <a:schemeClr val="accent1"/>
                 </a:solidFill>
               </a14:hiddenFill>
             </a:ext>
             <a:ext uri="{91240B29-F687-4F45-9708-019B960494DF}">
-              <a14:hiddenLine xmlns:a14="http://schemas.microsoft.com/office/drawing/2010/main" xmlns="" w="9525">
+              <a14:hiddenLine xmlns="" xmlns:a14="http://schemas.microsoft.com/office/drawing/2010/main" w="9525">
                 <a:solidFill>
                   <a:schemeClr val="tx1"/>
                 </a:solidFill>
@@ -495,7 +495,7 @@
               </a14:hiddenLine>
             </a:ext>
             <a:ext uri="{AF507438-7753-43E0-B8FC-AC1667EBCBE1}">
-              <a14:hiddenEffects xmlns:a14="http://schemas.microsoft.com/office/drawing/2010/main" xmlns="">
+              <a14:hiddenEffects xmlns="" xmlns:a14="http://schemas.microsoft.com/office/drawing/2010/main">
                 <a:effectLst>
                   <a:outerShdw dist="35921" dir="2700000" algn="ctr" rotWithShape="0">
                     <a:schemeClr val="bg2"/>
@@ -546,14 +546,14 @@
           <a:effectLst/>
           <a:extLst>
             <a:ext uri="{909E8E84-426E-40DD-AFC4-6F175D3DCCD1}">
-              <a14:hiddenFill xmlns:a14="http://schemas.microsoft.com/office/drawing/2010/main" xmlns="">
+              <a14:hiddenFill xmlns="" xmlns:a14="http://schemas.microsoft.com/office/drawing/2010/main">
                 <a:solidFill>
                   <a:schemeClr val="accent1"/>
                 </a:solidFill>
               </a14:hiddenFill>
             </a:ext>
             <a:ext uri="{91240B29-F687-4F45-9708-019B960494DF}">
-              <a14:hiddenLine xmlns:a14="http://schemas.microsoft.com/office/drawing/2010/main" xmlns="" w="9525">
+              <a14:hiddenLine xmlns="" xmlns:a14="http://schemas.microsoft.com/office/drawing/2010/main" w="9525">
                 <a:solidFill>
                   <a:schemeClr val="tx1"/>
                 </a:solidFill>
@@ -563,7 +563,7 @@
               </a14:hiddenLine>
             </a:ext>
             <a:ext uri="{AF507438-7753-43E0-B8FC-AC1667EBCBE1}">
-              <a14:hiddenEffects xmlns:a14="http://schemas.microsoft.com/office/drawing/2010/main" xmlns="">
+              <a14:hiddenEffects xmlns="" xmlns:a14="http://schemas.microsoft.com/office/drawing/2010/main">
                 <a:effectLst>
                   <a:outerShdw dist="35921" dir="2700000" algn="ctr" rotWithShape="0">
                     <a:schemeClr val="bg2"/>
@@ -597,7 +597,7 @@
     </p:spTree>
     <p:extLst>
       <p:ext uri="{BB962C8B-B14F-4D97-AF65-F5344CB8AC3E}">
-        <p14:creationId xmlns:p14="http://schemas.microsoft.com/office/powerpoint/2010/main" xmlns="" val="45029081"/>
+        <p14:creationId xmlns="" xmlns:p14="http://schemas.microsoft.com/office/powerpoint/2010/main" val="45029081"/>
       </p:ext>
     </p:extLst>
   </p:cSld>
@@ -802,7 +802,7 @@
     </p:spTree>
     <p:extLst>
       <p:ext uri="{BB962C8B-B14F-4D97-AF65-F5344CB8AC3E}">
-        <p14:creationId xmlns:p14="http://schemas.microsoft.com/office/powerpoint/2010/main" xmlns="" val="3162953695"/>
+        <p14:creationId xmlns="" xmlns:p14="http://schemas.microsoft.com/office/powerpoint/2010/main" val="3162953695"/>
       </p:ext>
     </p:extLst>
   </p:cSld>
@@ -887,7 +887,7 @@
     </p:spTree>
     <p:extLst>
       <p:ext uri="{BB962C8B-B14F-4D97-AF65-F5344CB8AC3E}">
-        <p14:creationId xmlns:p14="http://schemas.microsoft.com/office/powerpoint/2010/main" xmlns="" val="4074272823"/>
+        <p14:creationId xmlns="" xmlns:p14="http://schemas.microsoft.com/office/powerpoint/2010/main" val="4074272823"/>
       </p:ext>
     </p:extLst>
   </p:cSld>
@@ -972,7 +972,7 @@
     </p:spTree>
     <p:extLst>
       <p:ext uri="{BB962C8B-B14F-4D97-AF65-F5344CB8AC3E}">
-        <p14:creationId xmlns:p14="http://schemas.microsoft.com/office/powerpoint/2010/main" xmlns="" val="4074272823"/>
+        <p14:creationId xmlns="" xmlns:p14="http://schemas.microsoft.com/office/powerpoint/2010/main" val="4074272823"/>
       </p:ext>
     </p:extLst>
   </p:cSld>
@@ -1057,7 +1057,7 @@
     </p:spTree>
     <p:extLst>
       <p:ext uri="{BB962C8B-B14F-4D97-AF65-F5344CB8AC3E}">
-        <p14:creationId xmlns:p14="http://schemas.microsoft.com/office/powerpoint/2010/main" xmlns="" val="4074272823"/>
+        <p14:creationId xmlns="" xmlns:p14="http://schemas.microsoft.com/office/powerpoint/2010/main" val="4074272823"/>
       </p:ext>
     </p:extLst>
   </p:cSld>
@@ -1152,7 +1152,7 @@
     </p:spTree>
     <p:extLst>
       <p:ext uri="{BB962C8B-B14F-4D97-AF65-F5344CB8AC3E}">
-        <p14:creationId xmlns:p14="http://schemas.microsoft.com/office/powerpoint/2010/main" xmlns="" val="4074272823"/>
+        <p14:creationId xmlns="" xmlns:p14="http://schemas.microsoft.com/office/powerpoint/2010/main" val="4074272823"/>
       </p:ext>
     </p:extLst>
   </p:cSld>
@@ -1255,7 +1255,7 @@
     </p:spTree>
     <p:extLst>
       <p:ext uri="{BB962C8B-B14F-4D97-AF65-F5344CB8AC3E}">
-        <p14:creationId xmlns:p14="http://schemas.microsoft.com/office/powerpoint/2010/main" xmlns="" val="4074272823"/>
+        <p14:creationId xmlns="" xmlns:p14="http://schemas.microsoft.com/office/powerpoint/2010/main" val="4074272823"/>
       </p:ext>
     </p:extLst>
   </p:cSld>
@@ -1340,7 +1340,7 @@
     </p:spTree>
     <p:extLst>
       <p:ext uri="{BB962C8B-B14F-4D97-AF65-F5344CB8AC3E}">
-        <p14:creationId xmlns:p14="http://schemas.microsoft.com/office/powerpoint/2010/main" xmlns="" val="4074272823"/>
+        <p14:creationId xmlns="" xmlns:p14="http://schemas.microsoft.com/office/powerpoint/2010/main" val="4074272823"/>
       </p:ext>
     </p:extLst>
   </p:cSld>
@@ -1425,7 +1425,7 @@
     </p:spTree>
     <p:extLst>
       <p:ext uri="{BB962C8B-B14F-4D97-AF65-F5344CB8AC3E}">
-        <p14:creationId xmlns:p14="http://schemas.microsoft.com/office/powerpoint/2010/main" xmlns="" val="4074272823"/>
+        <p14:creationId xmlns="" xmlns:p14="http://schemas.microsoft.com/office/powerpoint/2010/main" val="4074272823"/>
       </p:ext>
     </p:extLst>
   </p:cSld>
@@ -1510,7 +1510,7 @@
     </p:spTree>
     <p:extLst>
       <p:ext uri="{BB962C8B-B14F-4D97-AF65-F5344CB8AC3E}">
-        <p14:creationId xmlns:p14="http://schemas.microsoft.com/office/powerpoint/2010/main" xmlns="" val="4074272823"/>
+        <p14:creationId xmlns="" xmlns:p14="http://schemas.microsoft.com/office/powerpoint/2010/main" val="4074272823"/>
       </p:ext>
     </p:extLst>
   </p:cSld>
@@ -1595,7 +1595,7 @@
     </p:spTree>
     <p:extLst>
       <p:ext uri="{BB962C8B-B14F-4D97-AF65-F5344CB8AC3E}">
-        <p14:creationId xmlns:p14="http://schemas.microsoft.com/office/powerpoint/2010/main" xmlns="" val="4074272823"/>
+        <p14:creationId xmlns="" xmlns:p14="http://schemas.microsoft.com/office/powerpoint/2010/main" val="4074272823"/>
       </p:ext>
     </p:extLst>
   </p:cSld>
@@ -1680,7 +1680,7 @@
     </p:spTree>
     <p:extLst>
       <p:ext uri="{BB962C8B-B14F-4D97-AF65-F5344CB8AC3E}">
-        <p14:creationId xmlns:p14="http://schemas.microsoft.com/office/powerpoint/2010/main" xmlns="" val="4074272823"/>
+        <p14:creationId xmlns="" xmlns:p14="http://schemas.microsoft.com/office/powerpoint/2010/main" val="4074272823"/>
       </p:ext>
     </p:extLst>
   </p:cSld>
@@ -1765,7 +1765,7 @@
     </p:spTree>
     <p:extLst>
       <p:ext uri="{BB962C8B-B14F-4D97-AF65-F5344CB8AC3E}">
-        <p14:creationId xmlns:p14="http://schemas.microsoft.com/office/powerpoint/2010/main" xmlns="" val="4074272823"/>
+        <p14:creationId xmlns="" xmlns:p14="http://schemas.microsoft.com/office/powerpoint/2010/main" val="4074272823"/>
       </p:ext>
     </p:extLst>
   </p:cSld>
@@ -1819,7 +1819,7 @@
           <a:effectLst/>
           <a:extLst>
             <a:ext uri="{91240B29-F687-4F45-9708-019B960494DF}">
-              <a14:hiddenLine xmlns:a14="http://schemas.microsoft.com/office/drawing/2010/main" xmlns="" w="9525">
+              <a14:hiddenLine xmlns="" xmlns:a14="http://schemas.microsoft.com/office/drawing/2010/main" w="9525">
                 <a:solidFill>
                   <a:schemeClr val="tx1"/>
                 </a:solidFill>
@@ -1829,7 +1829,7 @@
               </a14:hiddenLine>
             </a:ext>
             <a:ext uri="{AF507438-7753-43E0-B8FC-AC1667EBCBE1}">
-              <a14:hiddenEffects xmlns:a14="http://schemas.microsoft.com/office/drawing/2010/main" xmlns="">
+              <a14:hiddenEffects xmlns="" xmlns:a14="http://schemas.microsoft.com/office/drawing/2010/main">
                 <a:effectLst>
                   <a:outerShdw dist="35921" dir="2700000" algn="ctr" rotWithShape="0">
                     <a:schemeClr val="bg2"/>
@@ -1876,7 +1876,7 @@
           <a:effectLst/>
           <a:extLst>
             <a:ext uri="{91240B29-F687-4F45-9708-019B960494DF}">
-              <a14:hiddenLine xmlns:a14="http://schemas.microsoft.com/office/drawing/2010/main" xmlns="" w="9525">
+              <a14:hiddenLine xmlns="" xmlns:a14="http://schemas.microsoft.com/office/drawing/2010/main" w="9525">
                 <a:solidFill>
                   <a:schemeClr val="tx1"/>
                 </a:solidFill>
@@ -1886,7 +1886,7 @@
               </a14:hiddenLine>
             </a:ext>
             <a:ext uri="{AF507438-7753-43E0-B8FC-AC1667EBCBE1}">
-              <a14:hiddenEffects xmlns:a14="http://schemas.microsoft.com/office/drawing/2010/main" xmlns="">
+              <a14:hiddenEffects xmlns="" xmlns:a14="http://schemas.microsoft.com/office/drawing/2010/main">
                 <a:effectLst>
                   <a:outerShdw dist="35921" dir="2700000" algn="ctr" rotWithShape="0">
                     <a:schemeClr val="bg2"/>
@@ -1933,7 +1933,7 @@
           <a:effectLst/>
           <a:extLst>
             <a:ext uri="{91240B29-F687-4F45-9708-019B960494DF}">
-              <a14:hiddenLine xmlns:a14="http://schemas.microsoft.com/office/drawing/2010/main" xmlns="" w="9525">
+              <a14:hiddenLine xmlns="" xmlns:a14="http://schemas.microsoft.com/office/drawing/2010/main" w="9525">
                 <a:solidFill>
                   <a:schemeClr val="tx1"/>
                 </a:solidFill>
@@ -1943,7 +1943,7 @@
               </a14:hiddenLine>
             </a:ext>
             <a:ext uri="{AF507438-7753-43E0-B8FC-AC1667EBCBE1}">
-              <a14:hiddenEffects xmlns:a14="http://schemas.microsoft.com/office/drawing/2010/main" xmlns="">
+              <a14:hiddenEffects xmlns="" xmlns:a14="http://schemas.microsoft.com/office/drawing/2010/main">
                 <a:effectLst>
                   <a:outerShdw dist="35921" dir="2700000" algn="ctr" rotWithShape="0">
                     <a:schemeClr val="bg2"/>
@@ -1986,7 +1986,7 @@
           <a:effectLst/>
           <a:extLst>
             <a:ext uri="{91240B29-F687-4F45-9708-019B960494DF}">
-              <a14:hiddenLine xmlns:a14="http://schemas.microsoft.com/office/drawing/2010/main" xmlns="" w="9525">
+              <a14:hiddenLine xmlns="" xmlns:a14="http://schemas.microsoft.com/office/drawing/2010/main" w="9525">
                 <a:solidFill>
                   <a:schemeClr val="tx1"/>
                 </a:solidFill>
@@ -1996,7 +1996,7 @@
               </a14:hiddenLine>
             </a:ext>
             <a:ext uri="{AF507438-7753-43E0-B8FC-AC1667EBCBE1}">
-              <a14:hiddenEffects xmlns:a14="http://schemas.microsoft.com/office/drawing/2010/main" xmlns="">
+              <a14:hiddenEffects xmlns="" xmlns:a14="http://schemas.microsoft.com/office/drawing/2010/main">
                 <a:effectLst>
                   <a:outerShdw dist="35921" dir="2700000" algn="ctr" rotWithShape="0">
                     <a:schemeClr val="bg2"/>
@@ -2039,7 +2039,7 @@
           <a:effectLst/>
           <a:extLst>
             <a:ext uri="{91240B29-F687-4F45-9708-019B960494DF}">
-              <a14:hiddenLine xmlns:a14="http://schemas.microsoft.com/office/drawing/2010/main" xmlns="" w="9525">
+              <a14:hiddenLine xmlns="" xmlns:a14="http://schemas.microsoft.com/office/drawing/2010/main" w="9525">
                 <a:solidFill>
                   <a:schemeClr val="tx1"/>
                 </a:solidFill>
@@ -2049,7 +2049,7 @@
               </a14:hiddenLine>
             </a:ext>
             <a:ext uri="{AF507438-7753-43E0-B8FC-AC1667EBCBE1}">
-              <a14:hiddenEffects xmlns:a14="http://schemas.microsoft.com/office/drawing/2010/main" xmlns="">
+              <a14:hiddenEffects xmlns="" xmlns:a14="http://schemas.microsoft.com/office/drawing/2010/main">
                 <a:effectLst>
                   <a:outerShdw dist="35921" dir="2700000" algn="ctr" rotWithShape="0">
                     <a:schemeClr val="bg2"/>
@@ -2092,7 +2092,7 @@
           <a:effectLst/>
           <a:extLst>
             <a:ext uri="{91240B29-F687-4F45-9708-019B960494DF}">
-              <a14:hiddenLine xmlns:a14="http://schemas.microsoft.com/office/drawing/2010/main" xmlns="" w="9525">
+              <a14:hiddenLine xmlns="" xmlns:a14="http://schemas.microsoft.com/office/drawing/2010/main" w="9525">
                 <a:solidFill>
                   <a:schemeClr val="tx1"/>
                 </a:solidFill>
@@ -2102,7 +2102,7 @@
               </a14:hiddenLine>
             </a:ext>
             <a:ext uri="{AF507438-7753-43E0-B8FC-AC1667EBCBE1}">
-              <a14:hiddenEffects xmlns:a14="http://schemas.microsoft.com/office/drawing/2010/main" xmlns="">
+              <a14:hiddenEffects xmlns="" xmlns:a14="http://schemas.microsoft.com/office/drawing/2010/main">
                 <a:effectLst>
                   <a:outerShdw dist="35921" dir="2700000" algn="ctr" rotWithShape="0">
                     <a:schemeClr val="bg2"/>
@@ -2238,7 +2238,7 @@
             <a:effectLst/>
             <a:extLst>
               <a:ext uri="{91240B29-F687-4F45-9708-019B960494DF}">
-                <a14:hiddenLine xmlns:a14="http://schemas.microsoft.com/office/drawing/2010/main" xmlns="" w="9525">
+                <a14:hiddenLine xmlns="" xmlns:a14="http://schemas.microsoft.com/office/drawing/2010/main" w="9525">
                   <a:solidFill>
                     <a:schemeClr val="tx1"/>
                   </a:solidFill>
@@ -2248,7 +2248,7 @@
                 </a14:hiddenLine>
               </a:ext>
               <a:ext uri="{AF507438-7753-43E0-B8FC-AC1667EBCBE1}">
-                <a14:hiddenEffects xmlns:a14="http://schemas.microsoft.com/office/drawing/2010/main" xmlns="">
+                <a14:hiddenEffects xmlns="" xmlns:a14="http://schemas.microsoft.com/office/drawing/2010/main">
                   <a:effectLst>
                     <a:outerShdw dist="35921" dir="2700000" algn="ctr" rotWithShape="0">
                       <a:schemeClr val="bg2"/>
@@ -2368,7 +2368,7 @@
             <a:effectLst/>
             <a:extLst>
               <a:ext uri="{91240B29-F687-4F45-9708-019B960494DF}">
-                <a14:hiddenLine xmlns:a14="http://schemas.microsoft.com/office/drawing/2010/main" xmlns="" w="9525">
+                <a14:hiddenLine xmlns="" xmlns:a14="http://schemas.microsoft.com/office/drawing/2010/main" w="9525">
                   <a:solidFill>
                     <a:schemeClr val="tx1"/>
                   </a:solidFill>
@@ -2378,7 +2378,7 @@
                 </a14:hiddenLine>
               </a:ext>
               <a:ext uri="{AF507438-7753-43E0-B8FC-AC1667EBCBE1}">
-                <a14:hiddenEffects xmlns:a14="http://schemas.microsoft.com/office/drawing/2010/main" xmlns="">
+                <a14:hiddenEffects xmlns="" xmlns:a14="http://schemas.microsoft.com/office/drawing/2010/main">
                   <a:effectLst>
                     <a:outerShdw dist="35921" dir="2700000" algn="ctr" rotWithShape="0">
                       <a:schemeClr val="bg2"/>
@@ -2490,7 +2490,7 @@
             <a:effectLst/>
             <a:extLst>
               <a:ext uri="{91240B29-F687-4F45-9708-019B960494DF}">
-                <a14:hiddenLine xmlns:a14="http://schemas.microsoft.com/office/drawing/2010/main" xmlns="" w="9525">
+                <a14:hiddenLine xmlns="" xmlns:a14="http://schemas.microsoft.com/office/drawing/2010/main" w="9525">
                   <a:solidFill>
                     <a:schemeClr val="tx1"/>
                   </a:solidFill>
@@ -2500,7 +2500,7 @@
                 </a14:hiddenLine>
               </a:ext>
               <a:ext uri="{AF507438-7753-43E0-B8FC-AC1667EBCBE1}">
-                <a14:hiddenEffects xmlns:a14="http://schemas.microsoft.com/office/drawing/2010/main" xmlns="">
+                <a14:hiddenEffects xmlns="" xmlns:a14="http://schemas.microsoft.com/office/drawing/2010/main">
                   <a:effectLst>
                     <a:outerShdw dist="35921" dir="2700000" algn="ctr" rotWithShape="0">
                       <a:schemeClr val="bg2"/>
@@ -9354,7 +9354,7 @@
           <a:effectLst/>
           <a:extLst>
             <a:ext uri="{91240B29-F687-4F45-9708-019B960494DF}">
-              <a14:hiddenLine xmlns:a14="http://schemas.microsoft.com/office/drawing/2010/main" xmlns="" w="9525">
+              <a14:hiddenLine xmlns="" xmlns:a14="http://schemas.microsoft.com/office/drawing/2010/main" w="9525">
                 <a:solidFill>
                   <a:schemeClr val="tx1"/>
                 </a:solidFill>
@@ -9364,7 +9364,7 @@
               </a14:hiddenLine>
             </a:ext>
             <a:ext uri="{AF507438-7753-43E0-B8FC-AC1667EBCBE1}">
-              <a14:hiddenEffects xmlns:a14="http://schemas.microsoft.com/office/drawing/2010/main" xmlns="">
+              <a14:hiddenEffects xmlns="" xmlns:a14="http://schemas.microsoft.com/office/drawing/2010/main">
                 <a:effectLst>
                   <a:outerShdw dist="35921" dir="2700000" algn="ctr" rotWithShape="0">
                     <a:schemeClr val="bg2"/>
@@ -9407,7 +9407,7 @@
           <a:effectLst/>
           <a:extLst>
             <a:ext uri="{91240B29-F687-4F45-9708-019B960494DF}">
-              <a14:hiddenLine xmlns:a14="http://schemas.microsoft.com/office/drawing/2010/main" xmlns="" w="9525">
+              <a14:hiddenLine xmlns="" xmlns:a14="http://schemas.microsoft.com/office/drawing/2010/main" w="9525">
                 <a:solidFill>
                   <a:schemeClr val="tx1"/>
                 </a:solidFill>
@@ -9417,7 +9417,7 @@
               </a14:hiddenLine>
             </a:ext>
             <a:ext uri="{AF507438-7753-43E0-B8FC-AC1667EBCBE1}">
-              <a14:hiddenEffects xmlns:a14="http://schemas.microsoft.com/office/drawing/2010/main" xmlns="">
+              <a14:hiddenEffects xmlns="" xmlns:a14="http://schemas.microsoft.com/office/drawing/2010/main">
                 <a:effectLst>
                   <a:outerShdw dist="35921" dir="2700000" algn="ctr" rotWithShape="0">
                     <a:schemeClr val="bg2"/>
@@ -9553,7 +9553,7 @@
             <a:effectLst/>
             <a:extLst>
               <a:ext uri="{91240B29-F687-4F45-9708-019B960494DF}">
-                <a14:hiddenLine xmlns:a14="http://schemas.microsoft.com/office/drawing/2010/main" xmlns="" w="9525">
+                <a14:hiddenLine xmlns="" xmlns:a14="http://schemas.microsoft.com/office/drawing/2010/main" w="9525">
                   <a:solidFill>
                     <a:schemeClr val="tx1"/>
                   </a:solidFill>
@@ -9563,7 +9563,7 @@
                 </a14:hiddenLine>
               </a:ext>
               <a:ext uri="{AF507438-7753-43E0-B8FC-AC1667EBCBE1}">
-                <a14:hiddenEffects xmlns:a14="http://schemas.microsoft.com/office/drawing/2010/main" xmlns="">
+                <a14:hiddenEffects xmlns="" xmlns:a14="http://schemas.microsoft.com/office/drawing/2010/main">
                   <a:effectLst>
                     <a:outerShdw dist="35921" dir="2700000" algn="ctr" rotWithShape="0">
                       <a:schemeClr val="bg2"/>
@@ -9673,7 +9673,7 @@
             <a:effectLst/>
             <a:extLst>
               <a:ext uri="{91240B29-F687-4F45-9708-019B960494DF}">
-                <a14:hiddenLine xmlns:a14="http://schemas.microsoft.com/office/drawing/2010/main" xmlns="" w="9525">
+                <a14:hiddenLine xmlns="" xmlns:a14="http://schemas.microsoft.com/office/drawing/2010/main" w="9525">
                   <a:solidFill>
                     <a:schemeClr val="tx1"/>
                   </a:solidFill>
@@ -9683,7 +9683,7 @@
                 </a14:hiddenLine>
               </a:ext>
               <a:ext uri="{AF507438-7753-43E0-B8FC-AC1667EBCBE1}">
-                <a14:hiddenEffects xmlns:a14="http://schemas.microsoft.com/office/drawing/2010/main" xmlns="">
+                <a14:hiddenEffects xmlns="" xmlns:a14="http://schemas.microsoft.com/office/drawing/2010/main">
                   <a:effectLst>
                     <a:outerShdw dist="35921" dir="2700000" algn="ctr" rotWithShape="0">
                       <a:schemeClr val="bg2"/>
@@ -9795,7 +9795,7 @@
             <a:effectLst/>
             <a:extLst>
               <a:ext uri="{91240B29-F687-4F45-9708-019B960494DF}">
-                <a14:hiddenLine xmlns:a14="http://schemas.microsoft.com/office/drawing/2010/main" xmlns="" w="9525">
+                <a14:hiddenLine xmlns="" xmlns:a14="http://schemas.microsoft.com/office/drawing/2010/main" w="9525">
                   <a:solidFill>
                     <a:schemeClr val="tx1"/>
                   </a:solidFill>
@@ -9805,7 +9805,7 @@
                 </a14:hiddenLine>
               </a:ext>
               <a:ext uri="{AF507438-7753-43E0-B8FC-AC1667EBCBE1}">
-                <a14:hiddenEffects xmlns:a14="http://schemas.microsoft.com/office/drawing/2010/main" xmlns="">
+                <a14:hiddenEffects xmlns="" xmlns:a14="http://schemas.microsoft.com/office/drawing/2010/main">
                   <a:effectLst>
                     <a:outerShdw dist="35921" dir="2700000" algn="ctr" rotWithShape="0">
                       <a:schemeClr val="bg2"/>
@@ -9849,7 +9849,7 @@
           <a:effectLst/>
           <a:extLst>
             <a:ext uri="{91240B29-F687-4F45-9708-019B960494DF}">
-              <a14:hiddenLine xmlns:a14="http://schemas.microsoft.com/office/drawing/2010/main" xmlns="" w="9525">
+              <a14:hiddenLine xmlns="" xmlns:a14="http://schemas.microsoft.com/office/drawing/2010/main" w="9525">
                 <a:solidFill>
                   <a:schemeClr val="tx1"/>
                 </a:solidFill>
@@ -9859,7 +9859,7 @@
               </a14:hiddenLine>
             </a:ext>
             <a:ext uri="{AF507438-7753-43E0-B8FC-AC1667EBCBE1}">
-              <a14:hiddenEffects xmlns:a14="http://schemas.microsoft.com/office/drawing/2010/main" xmlns="">
+              <a14:hiddenEffects xmlns="" xmlns:a14="http://schemas.microsoft.com/office/drawing/2010/main">
                 <a:effectLst>
                   <a:outerShdw dist="35921" dir="2700000" algn="ctr" rotWithShape="0">
                     <a:schemeClr val="bg2"/>
@@ -9906,7 +9906,7 @@
           <a:effectLst/>
           <a:extLst>
             <a:ext uri="{91240B29-F687-4F45-9708-019B960494DF}">
-              <a14:hiddenLine xmlns:a14="http://schemas.microsoft.com/office/drawing/2010/main" xmlns="" w="9525">
+              <a14:hiddenLine xmlns="" xmlns:a14="http://schemas.microsoft.com/office/drawing/2010/main" w="9525">
                 <a:solidFill>
                   <a:schemeClr val="tx1"/>
                 </a:solidFill>
@@ -9916,7 +9916,7 @@
               </a14:hiddenLine>
             </a:ext>
             <a:ext uri="{AF507438-7753-43E0-B8FC-AC1667EBCBE1}">
-              <a14:hiddenEffects xmlns:a14="http://schemas.microsoft.com/office/drawing/2010/main" xmlns="">
+              <a14:hiddenEffects xmlns="" xmlns:a14="http://schemas.microsoft.com/office/drawing/2010/main">
                 <a:effectLst>
                   <a:outerShdw dist="35921" dir="2700000" algn="ctr" rotWithShape="0">
                     <a:schemeClr val="bg2"/>
@@ -9963,7 +9963,7 @@
           <a:effectLst/>
           <a:extLst>
             <a:ext uri="{91240B29-F687-4F45-9708-019B960494DF}">
-              <a14:hiddenLine xmlns:a14="http://schemas.microsoft.com/office/drawing/2010/main" xmlns="" w="9525">
+              <a14:hiddenLine xmlns="" xmlns:a14="http://schemas.microsoft.com/office/drawing/2010/main" w="9525">
                 <a:solidFill>
                   <a:schemeClr val="tx1"/>
                 </a:solidFill>
@@ -9973,7 +9973,7 @@
               </a14:hiddenLine>
             </a:ext>
             <a:ext uri="{AF507438-7753-43E0-B8FC-AC1667EBCBE1}">
-              <a14:hiddenEffects xmlns:a14="http://schemas.microsoft.com/office/drawing/2010/main" xmlns="">
+              <a14:hiddenEffects xmlns="" xmlns:a14="http://schemas.microsoft.com/office/drawing/2010/main">
                 <a:effectLst>
                   <a:outerShdw dist="35921" dir="2700000" algn="ctr" rotWithShape="0">
                     <a:schemeClr val="bg2"/>
@@ -10016,7 +10016,7 @@
           <a:effectLst/>
           <a:extLst>
             <a:ext uri="{91240B29-F687-4F45-9708-019B960494DF}">
-              <a14:hiddenLine xmlns:a14="http://schemas.microsoft.com/office/drawing/2010/main" xmlns="" w="9525">
+              <a14:hiddenLine xmlns="" xmlns:a14="http://schemas.microsoft.com/office/drawing/2010/main" w="9525">
                 <a:solidFill>
                   <a:schemeClr val="tx1"/>
                 </a:solidFill>
@@ -10026,7 +10026,7 @@
               </a14:hiddenLine>
             </a:ext>
             <a:ext uri="{AF507438-7753-43E0-B8FC-AC1667EBCBE1}">
-              <a14:hiddenEffects xmlns:a14="http://schemas.microsoft.com/office/drawing/2010/main" xmlns="">
+              <a14:hiddenEffects xmlns="" xmlns:a14="http://schemas.microsoft.com/office/drawing/2010/main">
                 <a:effectLst>
                   <a:outerShdw dist="35921" dir="2700000" algn="ctr" rotWithShape="0">
                     <a:schemeClr val="bg2"/>
@@ -10073,7 +10073,7 @@
           <a:effectLst/>
           <a:extLst>
             <a:ext uri="{91240B29-F687-4F45-9708-019B960494DF}">
-              <a14:hiddenLine xmlns:a14="http://schemas.microsoft.com/office/drawing/2010/main" xmlns="" w="9525">
+              <a14:hiddenLine xmlns="" xmlns:a14="http://schemas.microsoft.com/office/drawing/2010/main" w="9525">
                 <a:solidFill>
                   <a:schemeClr val="tx1"/>
                 </a:solidFill>
@@ -10083,7 +10083,7 @@
               </a14:hiddenLine>
             </a:ext>
             <a:ext uri="{AF507438-7753-43E0-B8FC-AC1667EBCBE1}">
-              <a14:hiddenEffects xmlns:a14="http://schemas.microsoft.com/office/drawing/2010/main" xmlns="">
+              <a14:hiddenEffects xmlns="" xmlns:a14="http://schemas.microsoft.com/office/drawing/2010/main">
                 <a:effectLst>
                   <a:outerShdw dist="35921" dir="2700000" algn="ctr" rotWithShape="0">
                     <a:schemeClr val="bg2"/>
@@ -10257,7 +10257,7 @@
           <a:effectLst/>
           <a:extLst>
             <a:ext uri="{91240B29-F687-4F45-9708-019B960494DF}">
-              <a14:hiddenLine xmlns:a14="http://schemas.microsoft.com/office/drawing/2010/main" xmlns="" w="9525">
+              <a14:hiddenLine xmlns="" xmlns:a14="http://schemas.microsoft.com/office/drawing/2010/main" w="9525">
                 <a:solidFill>
                   <a:schemeClr val="tx1"/>
                 </a:solidFill>
@@ -10267,7 +10267,7 @@
               </a14:hiddenLine>
             </a:ext>
             <a:ext uri="{AF507438-7753-43E0-B8FC-AC1667EBCBE1}">
-              <a14:hiddenEffects xmlns:a14="http://schemas.microsoft.com/office/drawing/2010/main" xmlns="">
+              <a14:hiddenEffects xmlns="" xmlns:a14="http://schemas.microsoft.com/office/drawing/2010/main">
                 <a:effectLst>
                   <a:outerShdw dist="35921" dir="2700000" algn="ctr" rotWithShape="0">
                     <a:schemeClr val="bg2"/>
@@ -10312,7 +10312,7 @@
           <a:effectLst/>
           <a:extLst>
             <a:ext uri="{91240B29-F687-4F45-9708-019B960494DF}">
-              <a14:hiddenLine xmlns:a14="http://schemas.microsoft.com/office/drawing/2010/main" xmlns="" w="9525">
+              <a14:hiddenLine xmlns="" xmlns:a14="http://schemas.microsoft.com/office/drawing/2010/main" w="9525">
                 <a:solidFill>
                   <a:schemeClr val="tx1"/>
                 </a:solidFill>
@@ -10322,7 +10322,7 @@
               </a14:hiddenLine>
             </a:ext>
             <a:ext uri="{AF507438-7753-43E0-B8FC-AC1667EBCBE1}">
-              <a14:hiddenEffects xmlns:a14="http://schemas.microsoft.com/office/drawing/2010/main" xmlns="">
+              <a14:hiddenEffects xmlns="" xmlns:a14="http://schemas.microsoft.com/office/drawing/2010/main">
                 <a:effectLst>
                   <a:outerShdw dist="35921" dir="2700000" algn="ctr" rotWithShape="0">
                     <a:schemeClr val="bg2"/>
@@ -10365,7 +10365,7 @@
           <a:effectLst/>
           <a:extLst>
             <a:ext uri="{91240B29-F687-4F45-9708-019B960494DF}">
-              <a14:hiddenLine xmlns:a14="http://schemas.microsoft.com/office/drawing/2010/main" xmlns="" w="9525">
+              <a14:hiddenLine xmlns="" xmlns:a14="http://schemas.microsoft.com/office/drawing/2010/main" w="9525">
                 <a:solidFill>
                   <a:schemeClr val="tx1"/>
                 </a:solidFill>
@@ -10375,7 +10375,7 @@
               </a14:hiddenLine>
             </a:ext>
             <a:ext uri="{AF507438-7753-43E0-B8FC-AC1667EBCBE1}">
-              <a14:hiddenEffects xmlns:a14="http://schemas.microsoft.com/office/drawing/2010/main" xmlns="">
+              <a14:hiddenEffects xmlns="" xmlns:a14="http://schemas.microsoft.com/office/drawing/2010/main">
                 <a:effectLst>
                   <a:outerShdw dist="35921" dir="2700000" algn="ctr" rotWithShape="0">
                     <a:schemeClr val="bg2"/>
@@ -10405,7 +10405,7 @@
           <a:blip r:embed="rId7" cstate="print">
             <a:extLst>
               <a:ext uri="{28A0092B-C50C-407E-A947-70E740481C1C}">
-                <a14:useLocalDpi xmlns:a14="http://schemas.microsoft.com/office/drawing/2010/main" xmlns="" val="0"/>
+                <a14:useLocalDpi xmlns="" xmlns:a14="http://schemas.microsoft.com/office/drawing/2010/main" val="0"/>
               </a:ext>
             </a:extLst>
           </a:blip>
@@ -10425,7 +10425,7 @@
           <a:noFill/>
           <a:extLst>
             <a:ext uri="{909E8E84-426E-40DD-AFC4-6F175D3DCCD1}">
-              <a14:hiddenFill xmlns:a14="http://schemas.microsoft.com/office/drawing/2010/main" xmlns="">
+              <a14:hiddenFill xmlns="" xmlns:a14="http://schemas.microsoft.com/office/drawing/2010/main">
                 <a:solidFill>
                   <a:srgbClr val="FFFFFF"/>
                 </a:solidFill>
@@ -10500,7 +10500,7 @@
           <a:effectLst/>
           <a:extLst>
             <a:ext uri="{91240B29-F687-4F45-9708-019B960494DF}">
-              <a14:hiddenLine xmlns:a14="http://schemas.microsoft.com/office/drawing/2010/main" xmlns="" w="9525">
+              <a14:hiddenLine xmlns="" xmlns:a14="http://schemas.microsoft.com/office/drawing/2010/main" w="9525">
                 <a:solidFill>
                   <a:schemeClr val="tx1"/>
                 </a:solidFill>
@@ -10510,7 +10510,7 @@
               </a14:hiddenLine>
             </a:ext>
             <a:ext uri="{AF507438-7753-43E0-B8FC-AC1667EBCBE1}">
-              <a14:hiddenEffects xmlns:a14="http://schemas.microsoft.com/office/drawing/2010/main" xmlns="">
+              <a14:hiddenEffects xmlns="" xmlns:a14="http://schemas.microsoft.com/office/drawing/2010/main">
                 <a:effectLst>
                   <a:outerShdw dist="35921" dir="2700000" algn="ctr" rotWithShape="0">
                     <a:schemeClr val="bg2"/>
@@ -10534,7 +10534,7 @@
     <a:masterClrMapping/>
   </p:clrMapOvr>
   <mc:AlternateContent xmlns:mc="http://schemas.openxmlformats.org/markup-compatibility/2006">
-    <mc:Choice xmlns:p14="http://schemas.microsoft.com/office/powerpoint/2010/main" xmlns="" Requires="p14">
+    <mc:Choice xmlns="" xmlns:p14="http://schemas.microsoft.com/office/powerpoint/2010/main" Requires="p14">
       <p:transition p14:dur="10"/>
     </mc:Choice>
     <mc:Fallback>
@@ -11385,7 +11385,7 @@
     </p:spTree>
     <p:extLst>
       <p:ext uri="{BB962C8B-B14F-4D97-AF65-F5344CB8AC3E}">
-        <p14:creationId xmlns:p14="http://schemas.microsoft.com/office/powerpoint/2010/main" xmlns="" val="3837632591"/>
+        <p14:creationId xmlns="" xmlns:p14="http://schemas.microsoft.com/office/powerpoint/2010/main" val="3837632591"/>
       </p:ext>
     </p:extLst>
   </p:cSld>
@@ -11393,7 +11393,7 @@
     <a:masterClrMapping/>
   </p:clrMapOvr>
   <mc:AlternateContent xmlns:mc="http://schemas.openxmlformats.org/markup-compatibility/2006">
-    <mc:Choice xmlns:p14="http://schemas.microsoft.com/office/powerpoint/2010/main" xmlns="" Requires="p14">
+    <mc:Choice xmlns="" xmlns:p14="http://schemas.microsoft.com/office/powerpoint/2010/main" Requires="p14">
       <p:transition p14:dur="10"/>
     </mc:Choice>
     <mc:Fallback>
@@ -11589,7 +11589,7 @@
     </p:spTree>
     <p:extLst>
       <p:ext uri="{BB962C8B-B14F-4D97-AF65-F5344CB8AC3E}">
-        <p14:creationId xmlns:p14="http://schemas.microsoft.com/office/powerpoint/2010/main" xmlns="" val="2834318928"/>
+        <p14:creationId xmlns="" xmlns:p14="http://schemas.microsoft.com/office/powerpoint/2010/main" val="2834318928"/>
       </p:ext>
     </p:extLst>
   </p:cSld>
@@ -11597,7 +11597,7 @@
     <a:masterClrMapping/>
   </p:clrMapOvr>
   <mc:AlternateContent xmlns:mc="http://schemas.openxmlformats.org/markup-compatibility/2006">
-    <mc:Choice xmlns:p14="http://schemas.microsoft.com/office/powerpoint/2010/main" xmlns="" Requires="p14">
+    <mc:Choice xmlns="" xmlns:p14="http://schemas.microsoft.com/office/powerpoint/2010/main" Requires="p14">
       <p:transition p14:dur="10"/>
     </mc:Choice>
     <mc:Fallback>
@@ -11880,7 +11880,7 @@
     </p:spTree>
     <p:extLst>
       <p:ext uri="{BB962C8B-B14F-4D97-AF65-F5344CB8AC3E}">
-        <p14:creationId xmlns:p14="http://schemas.microsoft.com/office/powerpoint/2010/main" xmlns="" val="4048891960"/>
+        <p14:creationId xmlns="" xmlns:p14="http://schemas.microsoft.com/office/powerpoint/2010/main" val="4048891960"/>
       </p:ext>
     </p:extLst>
   </p:cSld>
@@ -11888,7 +11888,7 @@
     <a:masterClrMapping/>
   </p:clrMapOvr>
   <mc:AlternateContent xmlns:mc="http://schemas.openxmlformats.org/markup-compatibility/2006">
-    <mc:Choice xmlns:p14="http://schemas.microsoft.com/office/powerpoint/2010/main" xmlns="" Requires="p14">
+    <mc:Choice xmlns="" xmlns:p14="http://schemas.microsoft.com/office/powerpoint/2010/main" Requires="p14">
       <p:transition p14:dur="10"/>
     </mc:Choice>
     <mc:Fallback>
@@ -12070,7 +12070,7 @@
     </p:spTree>
     <p:extLst>
       <p:ext uri="{BB962C8B-B14F-4D97-AF65-F5344CB8AC3E}">
-        <p14:creationId xmlns:p14="http://schemas.microsoft.com/office/powerpoint/2010/main" xmlns="" val="356270086"/>
+        <p14:creationId xmlns="" xmlns:p14="http://schemas.microsoft.com/office/powerpoint/2010/main" val="356270086"/>
       </p:ext>
     </p:extLst>
   </p:cSld>
@@ -12078,7 +12078,7 @@
     <a:masterClrMapping/>
   </p:clrMapOvr>
   <mc:AlternateContent xmlns:mc="http://schemas.openxmlformats.org/markup-compatibility/2006">
-    <mc:Choice xmlns:p14="http://schemas.microsoft.com/office/powerpoint/2010/main" xmlns="" Requires="p14">
+    <mc:Choice xmlns="" xmlns:p14="http://schemas.microsoft.com/office/powerpoint/2010/main" Requires="p14">
       <p:transition p14:dur="10"/>
     </mc:Choice>
     <mc:Fallback>
@@ -12253,7 +12253,7 @@
     </p:spTree>
     <p:extLst>
       <p:ext uri="{BB962C8B-B14F-4D97-AF65-F5344CB8AC3E}">
-        <p14:creationId xmlns:p14="http://schemas.microsoft.com/office/powerpoint/2010/main" xmlns="" val="1537390044"/>
+        <p14:creationId xmlns="" xmlns:p14="http://schemas.microsoft.com/office/powerpoint/2010/main" val="1537390044"/>
       </p:ext>
     </p:extLst>
   </p:cSld>
@@ -12261,7 +12261,7 @@
     <a:masterClrMapping/>
   </p:clrMapOvr>
   <mc:AlternateContent xmlns:mc="http://schemas.openxmlformats.org/markup-compatibility/2006">
-    <mc:Choice xmlns:p14="http://schemas.microsoft.com/office/powerpoint/2010/main" xmlns="" Requires="p14">
+    <mc:Choice xmlns="" xmlns:p14="http://schemas.microsoft.com/office/powerpoint/2010/main" Requires="p14">
       <p:transition p14:dur="10"/>
     </mc:Choice>
     <mc:Fallback>
@@ -12444,7 +12444,7 @@
     </p:spTree>
     <p:extLst>
       <p:ext uri="{BB962C8B-B14F-4D97-AF65-F5344CB8AC3E}">
-        <p14:creationId xmlns:p14="http://schemas.microsoft.com/office/powerpoint/2010/main" xmlns="" val="2350597799"/>
+        <p14:creationId xmlns="" xmlns:p14="http://schemas.microsoft.com/office/powerpoint/2010/main" val="2350597799"/>
       </p:ext>
     </p:extLst>
   </p:cSld>
@@ -12452,7 +12452,7 @@
     <a:masterClrMapping/>
   </p:clrMapOvr>
   <mc:AlternateContent xmlns:mc="http://schemas.openxmlformats.org/markup-compatibility/2006">
-    <mc:Choice xmlns:p14="http://schemas.microsoft.com/office/powerpoint/2010/main" xmlns="" Requires="p14">
+    <mc:Choice xmlns="" xmlns:p14="http://schemas.microsoft.com/office/powerpoint/2010/main" Requires="p14">
       <p:transition p14:dur="10"/>
     </mc:Choice>
     <mc:Fallback>
@@ -12631,7 +12631,7 @@
     </p:spTree>
     <p:extLst>
       <p:ext uri="{BB962C8B-B14F-4D97-AF65-F5344CB8AC3E}">
-        <p14:creationId xmlns:p14="http://schemas.microsoft.com/office/powerpoint/2010/main" xmlns="" val="1553643063"/>
+        <p14:creationId xmlns="" xmlns:p14="http://schemas.microsoft.com/office/powerpoint/2010/main" val="1553643063"/>
       </p:ext>
     </p:extLst>
   </p:cSld>
@@ -12639,7 +12639,7 @@
     <a:masterClrMapping/>
   </p:clrMapOvr>
   <mc:AlternateContent xmlns:mc="http://schemas.openxmlformats.org/markup-compatibility/2006">
-    <mc:Choice xmlns:p14="http://schemas.microsoft.com/office/powerpoint/2010/main" xmlns="" Requires="p14">
+    <mc:Choice xmlns="" xmlns:p14="http://schemas.microsoft.com/office/powerpoint/2010/main" Requires="p14">
       <p:transition p14:dur="10"/>
     </mc:Choice>
     <mc:Fallback>
@@ -12840,7 +12840,7 @@
     </p:spTree>
     <p:extLst>
       <p:ext uri="{BB962C8B-B14F-4D97-AF65-F5344CB8AC3E}">
-        <p14:creationId xmlns:p14="http://schemas.microsoft.com/office/powerpoint/2010/main" xmlns="" val="3931288045"/>
+        <p14:creationId xmlns="" xmlns:p14="http://schemas.microsoft.com/office/powerpoint/2010/main" val="3931288045"/>
       </p:ext>
     </p:extLst>
   </p:cSld>
@@ -12848,7 +12848,7 @@
     <a:masterClrMapping/>
   </p:clrMapOvr>
   <mc:AlternateContent xmlns:mc="http://schemas.openxmlformats.org/markup-compatibility/2006">
-    <mc:Choice xmlns:p14="http://schemas.microsoft.com/office/powerpoint/2010/main" xmlns="" Requires="p14">
+    <mc:Choice xmlns="" xmlns:p14="http://schemas.microsoft.com/office/powerpoint/2010/main" Requires="p14">
       <p:transition p14:dur="10"/>
     </mc:Choice>
     <mc:Fallback>
@@ -13145,7 +13145,7 @@
     </p:spTree>
     <p:extLst>
       <p:ext uri="{BB962C8B-B14F-4D97-AF65-F5344CB8AC3E}">
-        <p14:creationId xmlns:p14="http://schemas.microsoft.com/office/powerpoint/2010/main" xmlns="" val="1436502707"/>
+        <p14:creationId xmlns="" xmlns:p14="http://schemas.microsoft.com/office/powerpoint/2010/main" val="1436502707"/>
       </p:ext>
     </p:extLst>
   </p:cSld>
@@ -13153,7 +13153,7 @@
     <a:masterClrMapping/>
   </p:clrMapOvr>
   <mc:AlternateContent xmlns:mc="http://schemas.openxmlformats.org/markup-compatibility/2006">
-    <mc:Choice xmlns:p14="http://schemas.microsoft.com/office/powerpoint/2010/main" xmlns="" Requires="p14">
+    <mc:Choice xmlns="" xmlns:p14="http://schemas.microsoft.com/office/powerpoint/2010/main" Requires="p14">
       <p:transition p14:dur="10"/>
     </mc:Choice>
     <mc:Fallback>
@@ -13589,7 +13589,7 @@
     </p:spTree>
     <p:extLst>
       <p:ext uri="{BB962C8B-B14F-4D97-AF65-F5344CB8AC3E}">
-        <p14:creationId xmlns:p14="http://schemas.microsoft.com/office/powerpoint/2010/main" xmlns="" val="4218482637"/>
+        <p14:creationId xmlns="" xmlns:p14="http://schemas.microsoft.com/office/powerpoint/2010/main" val="4218482637"/>
       </p:ext>
     </p:extLst>
   </p:cSld>
@@ -13597,7 +13597,7 @@
     <a:masterClrMapping/>
   </p:clrMapOvr>
   <mc:AlternateContent xmlns:mc="http://schemas.openxmlformats.org/markup-compatibility/2006">
-    <mc:Choice xmlns:p14="http://schemas.microsoft.com/office/powerpoint/2010/main" xmlns="" Requires="p14">
+    <mc:Choice xmlns="" xmlns:p14="http://schemas.microsoft.com/office/powerpoint/2010/main" Requires="p14">
       <p:transition p14:dur="10"/>
     </mc:Choice>
     <mc:Fallback>
@@ -13724,7 +13724,7 @@
     </p:spTree>
     <p:extLst>
       <p:ext uri="{BB962C8B-B14F-4D97-AF65-F5344CB8AC3E}">
-        <p14:creationId xmlns:p14="http://schemas.microsoft.com/office/powerpoint/2010/main" xmlns="" val="3367094085"/>
+        <p14:creationId xmlns="" xmlns:p14="http://schemas.microsoft.com/office/powerpoint/2010/main" val="3367094085"/>
       </p:ext>
     </p:extLst>
   </p:cSld>
@@ -13732,7 +13732,7 @@
     <a:masterClrMapping/>
   </p:clrMapOvr>
   <mc:AlternateContent xmlns:mc="http://schemas.openxmlformats.org/markup-compatibility/2006">
-    <mc:Choice xmlns:p14="http://schemas.microsoft.com/office/powerpoint/2010/main" xmlns="" Requires="p14">
+    <mc:Choice xmlns="" xmlns:p14="http://schemas.microsoft.com/office/powerpoint/2010/main" Requires="p14">
       <p:transition p14:dur="10"/>
     </mc:Choice>
     <mc:Fallback>
@@ -13836,7 +13836,7 @@
     </p:spTree>
     <p:extLst>
       <p:ext uri="{BB962C8B-B14F-4D97-AF65-F5344CB8AC3E}">
-        <p14:creationId xmlns:p14="http://schemas.microsoft.com/office/powerpoint/2010/main" xmlns="" val="1902852705"/>
+        <p14:creationId xmlns="" xmlns:p14="http://schemas.microsoft.com/office/powerpoint/2010/main" val="1902852705"/>
       </p:ext>
     </p:extLst>
   </p:cSld>
@@ -13844,7 +13844,7 @@
     <a:masterClrMapping/>
   </p:clrMapOvr>
   <mc:AlternateContent xmlns:mc="http://schemas.openxmlformats.org/markup-compatibility/2006">
-    <mc:Choice xmlns:p14="http://schemas.microsoft.com/office/powerpoint/2010/main" xmlns="" Requires="p14">
+    <mc:Choice xmlns="" xmlns:p14="http://schemas.microsoft.com/office/powerpoint/2010/main" Requires="p14">
       <p:transition p14:dur="10"/>
     </mc:Choice>
     <mc:Fallback>
@@ -14130,7 +14130,7 @@
     </p:spTree>
     <p:extLst>
       <p:ext uri="{BB962C8B-B14F-4D97-AF65-F5344CB8AC3E}">
-        <p14:creationId xmlns:p14="http://schemas.microsoft.com/office/powerpoint/2010/main" xmlns="" val="3975071873"/>
+        <p14:creationId xmlns="" xmlns:p14="http://schemas.microsoft.com/office/powerpoint/2010/main" val="3975071873"/>
       </p:ext>
     </p:extLst>
   </p:cSld>
@@ -14138,7 +14138,7 @@
     <a:masterClrMapping/>
   </p:clrMapOvr>
   <mc:AlternateContent xmlns:mc="http://schemas.openxmlformats.org/markup-compatibility/2006">
-    <mc:Choice xmlns:p14="http://schemas.microsoft.com/office/powerpoint/2010/main" xmlns="" Requires="p14">
+    <mc:Choice xmlns="" xmlns:p14="http://schemas.microsoft.com/office/powerpoint/2010/main" Requires="p14">
       <p:transition p14:dur="10"/>
     </mc:Choice>
     <mc:Fallback>
@@ -14404,7 +14404,7 @@
     </p:spTree>
     <p:extLst>
       <p:ext uri="{BB962C8B-B14F-4D97-AF65-F5344CB8AC3E}">
-        <p14:creationId xmlns:p14="http://schemas.microsoft.com/office/powerpoint/2010/main" xmlns="" val="3345478573"/>
+        <p14:creationId xmlns="" xmlns:p14="http://schemas.microsoft.com/office/powerpoint/2010/main" val="3345478573"/>
       </p:ext>
     </p:extLst>
   </p:cSld>
@@ -14412,7 +14412,7 @@
     <a:masterClrMapping/>
   </p:clrMapOvr>
   <mc:AlternateContent xmlns:mc="http://schemas.openxmlformats.org/markup-compatibility/2006">
-    <mc:Choice xmlns:p14="http://schemas.microsoft.com/office/powerpoint/2010/main" xmlns="" Requires="p14">
+    <mc:Choice xmlns="" xmlns:p14="http://schemas.microsoft.com/office/powerpoint/2010/main" Requires="p14">
       <p:transition p14:dur="10"/>
     </mc:Choice>
     <mc:Fallback>
@@ -21279,7 +21279,7 @@
           <a:effectLst/>
           <a:extLst>
             <a:ext uri="{91240B29-F687-4F45-9708-019B960494DF}">
-              <a14:hiddenLine xmlns:a14="http://schemas.microsoft.com/office/drawing/2010/main" xmlns="" w="9525">
+              <a14:hiddenLine xmlns="" xmlns:a14="http://schemas.microsoft.com/office/drawing/2010/main" w="9525">
                 <a:solidFill>
                   <a:schemeClr val="tx1"/>
                 </a:solidFill>
@@ -21289,7 +21289,7 @@
               </a14:hiddenLine>
             </a:ext>
             <a:ext uri="{AF507438-7753-43E0-B8FC-AC1667EBCBE1}">
-              <a14:hiddenEffects xmlns:a14="http://schemas.microsoft.com/office/drawing/2010/main" xmlns="">
+              <a14:hiddenEffects xmlns="" xmlns:a14="http://schemas.microsoft.com/office/drawing/2010/main">
                 <a:effectLst>
                   <a:outerShdw dist="35921" dir="2700000" algn="ctr" rotWithShape="0">
                     <a:schemeClr val="bg2"/>
@@ -21399,7 +21399,7 @@
           <a:effectLst/>
           <a:extLst>
             <a:ext uri="{91240B29-F687-4F45-9708-019B960494DF}">
-              <a14:hiddenLine xmlns:a14="http://schemas.microsoft.com/office/drawing/2010/main" xmlns="" w="9525">
+              <a14:hiddenLine xmlns="" xmlns:a14="http://schemas.microsoft.com/office/drawing/2010/main" w="9525">
                 <a:solidFill>
                   <a:schemeClr val="tx1"/>
                 </a:solidFill>
@@ -21409,7 +21409,7 @@
               </a14:hiddenLine>
             </a:ext>
             <a:ext uri="{AF507438-7753-43E0-B8FC-AC1667EBCBE1}">
-              <a14:hiddenEffects xmlns:a14="http://schemas.microsoft.com/office/drawing/2010/main" xmlns="">
+              <a14:hiddenEffects xmlns="" xmlns:a14="http://schemas.microsoft.com/office/drawing/2010/main">
                 <a:effectLst>
                   <a:outerShdw dist="35921" dir="2700000" algn="ctr" rotWithShape="0">
                     <a:schemeClr val="bg2"/>
@@ -21518,7 +21518,7 @@
           <a:effectLst/>
           <a:extLst>
             <a:ext uri="{91240B29-F687-4F45-9708-019B960494DF}">
-              <a14:hiddenLine xmlns:a14="http://schemas.microsoft.com/office/drawing/2010/main" xmlns="" w="9525">
+              <a14:hiddenLine xmlns="" xmlns:a14="http://schemas.microsoft.com/office/drawing/2010/main" w="9525">
                 <a:solidFill>
                   <a:schemeClr val="tx1"/>
                 </a:solidFill>
@@ -21528,7 +21528,7 @@
               </a14:hiddenLine>
             </a:ext>
             <a:ext uri="{AF507438-7753-43E0-B8FC-AC1667EBCBE1}">
-              <a14:hiddenEffects xmlns:a14="http://schemas.microsoft.com/office/drawing/2010/main" xmlns="">
+              <a14:hiddenEffects xmlns="" xmlns:a14="http://schemas.microsoft.com/office/drawing/2010/main">
                 <a:effectLst>
                   <a:outerShdw dist="35921" dir="2700000" algn="ctr" rotWithShape="0">
                     <a:schemeClr val="bg2"/>
@@ -21638,7 +21638,7 @@
           <a:effectLst/>
           <a:extLst>
             <a:ext uri="{91240B29-F687-4F45-9708-019B960494DF}">
-              <a14:hiddenLine xmlns:a14="http://schemas.microsoft.com/office/drawing/2010/main" xmlns="" w="9525">
+              <a14:hiddenLine xmlns="" xmlns:a14="http://schemas.microsoft.com/office/drawing/2010/main" w="9525">
                 <a:solidFill>
                   <a:schemeClr val="tx1"/>
                 </a:solidFill>
@@ -21648,7 +21648,7 @@
               </a14:hiddenLine>
             </a:ext>
             <a:ext uri="{AF507438-7753-43E0-B8FC-AC1667EBCBE1}">
-              <a14:hiddenEffects xmlns:a14="http://schemas.microsoft.com/office/drawing/2010/main" xmlns="">
+              <a14:hiddenEffects xmlns="" xmlns:a14="http://schemas.microsoft.com/office/drawing/2010/main">
                 <a:effectLst>
                   <a:outerShdw dist="35921" dir="2700000" algn="ctr" rotWithShape="0">
                     <a:schemeClr val="bg2"/>
@@ -21770,7 +21770,7 @@
           <a:effectLst/>
           <a:extLst>
             <a:ext uri="{91240B29-F687-4F45-9708-019B960494DF}">
-              <a14:hiddenLine xmlns:a14="http://schemas.microsoft.com/office/drawing/2010/main" xmlns="" w="9525">
+              <a14:hiddenLine xmlns="" xmlns:a14="http://schemas.microsoft.com/office/drawing/2010/main" w="9525">
                 <a:solidFill>
                   <a:schemeClr val="tx1"/>
                 </a:solidFill>
@@ -21780,7 +21780,7 @@
               </a14:hiddenLine>
             </a:ext>
             <a:ext uri="{AF507438-7753-43E0-B8FC-AC1667EBCBE1}">
-              <a14:hiddenEffects xmlns:a14="http://schemas.microsoft.com/office/drawing/2010/main" xmlns="">
+              <a14:hiddenEffects xmlns="" xmlns:a14="http://schemas.microsoft.com/office/drawing/2010/main">
                 <a:effectLst>
                   <a:outerShdw dist="35921" dir="2700000" algn="ctr" rotWithShape="0">
                     <a:schemeClr val="bg2"/>
@@ -21823,7 +21823,7 @@
           <a:effectLst/>
           <a:extLst>
             <a:ext uri="{91240B29-F687-4F45-9708-019B960494DF}">
-              <a14:hiddenLine xmlns:a14="http://schemas.microsoft.com/office/drawing/2010/main" xmlns="" w="9525">
+              <a14:hiddenLine xmlns="" xmlns:a14="http://schemas.microsoft.com/office/drawing/2010/main" w="9525">
                 <a:solidFill>
                   <a:schemeClr val="tx1"/>
                 </a:solidFill>
@@ -21833,7 +21833,7 @@
               </a14:hiddenLine>
             </a:ext>
             <a:ext uri="{AF507438-7753-43E0-B8FC-AC1667EBCBE1}">
-              <a14:hiddenEffects xmlns:a14="http://schemas.microsoft.com/office/drawing/2010/main" xmlns="">
+              <a14:hiddenEffects xmlns="" xmlns:a14="http://schemas.microsoft.com/office/drawing/2010/main">
                 <a:effectLst>
                   <a:outerShdw dist="35921" dir="2700000" algn="ctr" rotWithShape="0">
                     <a:schemeClr val="bg2"/>
@@ -21929,7 +21929,7 @@
           <a:effectLst/>
           <a:extLst>
             <a:ext uri="{91240B29-F687-4F45-9708-019B960494DF}">
-              <a14:hiddenLine xmlns:a14="http://schemas.microsoft.com/office/drawing/2010/main" xmlns="" w="9525">
+              <a14:hiddenLine xmlns="" xmlns:a14="http://schemas.microsoft.com/office/drawing/2010/main" w="9525">
                 <a:solidFill>
                   <a:schemeClr val="tx1"/>
                 </a:solidFill>
@@ -21939,7 +21939,7 @@
               </a14:hiddenLine>
             </a:ext>
             <a:ext uri="{AF507438-7753-43E0-B8FC-AC1667EBCBE1}">
-              <a14:hiddenEffects xmlns:a14="http://schemas.microsoft.com/office/drawing/2010/main" xmlns="">
+              <a14:hiddenEffects xmlns="" xmlns:a14="http://schemas.microsoft.com/office/drawing/2010/main">
                 <a:effectLst>
                   <a:outerShdw dist="35921" dir="2700000" algn="ctr" rotWithShape="0">
                     <a:schemeClr val="bg2"/>
@@ -21982,14 +21982,14 @@
           <a:effectLst/>
           <a:extLst>
             <a:ext uri="{909E8E84-426E-40DD-AFC4-6F175D3DCCD1}">
-              <a14:hiddenFill xmlns:a14="http://schemas.microsoft.com/office/drawing/2010/main" xmlns="">
+              <a14:hiddenFill xmlns="" xmlns:a14="http://schemas.microsoft.com/office/drawing/2010/main">
                 <a:solidFill>
                   <a:schemeClr val="accent1"/>
                 </a:solidFill>
               </a14:hiddenFill>
             </a:ext>
             <a:ext uri="{91240B29-F687-4F45-9708-019B960494DF}">
-              <a14:hiddenLine xmlns:a14="http://schemas.microsoft.com/office/drawing/2010/main" xmlns="" w="9525">
+              <a14:hiddenLine xmlns="" xmlns:a14="http://schemas.microsoft.com/office/drawing/2010/main" w="9525">
                 <a:solidFill>
                   <a:schemeClr val="tx1"/>
                 </a:solidFill>
@@ -21999,7 +21999,7 @@
               </a14:hiddenLine>
             </a:ext>
             <a:ext uri="{AF507438-7753-43E0-B8FC-AC1667EBCBE1}">
-              <a14:hiddenEffects xmlns:a14="http://schemas.microsoft.com/office/drawing/2010/main" xmlns="">
+              <a14:hiddenEffects xmlns="" xmlns:a14="http://schemas.microsoft.com/office/drawing/2010/main">
                 <a:effectLst>
                   <a:outerShdw dist="35921" dir="2700000" algn="ctr" rotWithShape="0">
                     <a:schemeClr val="bg2"/>
@@ -22051,14 +22051,14 @@
           <a:effectLst/>
           <a:extLst>
             <a:ext uri="{909E8E84-426E-40DD-AFC4-6F175D3DCCD1}">
-              <a14:hiddenFill xmlns:a14="http://schemas.microsoft.com/office/drawing/2010/main" xmlns="">
+              <a14:hiddenFill xmlns="" xmlns:a14="http://schemas.microsoft.com/office/drawing/2010/main">
                 <a:solidFill>
                   <a:schemeClr val="accent1"/>
                 </a:solidFill>
               </a14:hiddenFill>
             </a:ext>
             <a:ext uri="{91240B29-F687-4F45-9708-019B960494DF}">
-              <a14:hiddenLine xmlns:a14="http://schemas.microsoft.com/office/drawing/2010/main" xmlns="" w="9525">
+              <a14:hiddenLine xmlns="" xmlns:a14="http://schemas.microsoft.com/office/drawing/2010/main" w="9525">
                 <a:solidFill>
                   <a:schemeClr val="tx1"/>
                 </a:solidFill>
@@ -22068,7 +22068,7 @@
               </a14:hiddenLine>
             </a:ext>
             <a:ext uri="{AF507438-7753-43E0-B8FC-AC1667EBCBE1}">
-              <a14:hiddenEffects xmlns:a14="http://schemas.microsoft.com/office/drawing/2010/main" xmlns="">
+              <a14:hiddenEffects xmlns="" xmlns:a14="http://schemas.microsoft.com/office/drawing/2010/main">
                 <a:effectLst>
                   <a:outerShdw dist="35921" dir="2700000" algn="ctr" rotWithShape="0">
                     <a:schemeClr val="bg2"/>
@@ -22148,14 +22148,14 @@
           <a:effectLst/>
           <a:extLst>
             <a:ext uri="{909E8E84-426E-40DD-AFC4-6F175D3DCCD1}">
-              <a14:hiddenFill xmlns:a14="http://schemas.microsoft.com/office/drawing/2010/main" xmlns="">
+              <a14:hiddenFill xmlns="" xmlns:a14="http://schemas.microsoft.com/office/drawing/2010/main">
                 <a:solidFill>
                   <a:schemeClr val="accent1"/>
                 </a:solidFill>
               </a14:hiddenFill>
             </a:ext>
             <a:ext uri="{91240B29-F687-4F45-9708-019B960494DF}">
-              <a14:hiddenLine xmlns:a14="http://schemas.microsoft.com/office/drawing/2010/main" xmlns="" w="9525">
+              <a14:hiddenLine xmlns="" xmlns:a14="http://schemas.microsoft.com/office/drawing/2010/main" w="9525">
                 <a:solidFill>
                   <a:schemeClr val="tx1"/>
                 </a:solidFill>
@@ -22165,7 +22165,7 @@
               </a14:hiddenLine>
             </a:ext>
             <a:ext uri="{AF507438-7753-43E0-B8FC-AC1667EBCBE1}">
-              <a14:hiddenEffects xmlns:a14="http://schemas.microsoft.com/office/drawing/2010/main" xmlns="">
+              <a14:hiddenEffects xmlns="" xmlns:a14="http://schemas.microsoft.com/office/drawing/2010/main">
                 <a:effectLst>
                   <a:outerShdw dist="35921" dir="2700000" algn="ctr" rotWithShape="0">
                     <a:schemeClr val="bg2"/>
@@ -22221,14 +22221,14 @@
           <a:effectLst/>
           <a:extLst>
             <a:ext uri="{909E8E84-426E-40DD-AFC4-6F175D3DCCD1}">
-              <a14:hiddenFill xmlns:a14="http://schemas.microsoft.com/office/drawing/2010/main" xmlns="">
+              <a14:hiddenFill xmlns="" xmlns:a14="http://schemas.microsoft.com/office/drawing/2010/main">
                 <a:solidFill>
                   <a:schemeClr val="accent1"/>
                 </a:solidFill>
               </a14:hiddenFill>
             </a:ext>
             <a:ext uri="{91240B29-F687-4F45-9708-019B960494DF}">
-              <a14:hiddenLine xmlns:a14="http://schemas.microsoft.com/office/drawing/2010/main" xmlns="" w="9525">
+              <a14:hiddenLine xmlns="" xmlns:a14="http://schemas.microsoft.com/office/drawing/2010/main" w="9525">
                 <a:solidFill>
                   <a:schemeClr val="tx1"/>
                 </a:solidFill>
@@ -22238,7 +22238,7 @@
               </a14:hiddenLine>
             </a:ext>
             <a:ext uri="{AF507438-7753-43E0-B8FC-AC1667EBCBE1}">
-              <a14:hiddenEffects xmlns:a14="http://schemas.microsoft.com/office/drawing/2010/main" xmlns="">
+              <a14:hiddenEffects xmlns="" xmlns:a14="http://schemas.microsoft.com/office/drawing/2010/main">
                 <a:effectLst>
                   <a:outerShdw dist="35921" dir="2700000" algn="ctr" rotWithShape="0">
                     <a:schemeClr val="bg2"/>
@@ -22294,14 +22294,14 @@
           <a:effectLst/>
           <a:extLst>
             <a:ext uri="{909E8E84-426E-40DD-AFC4-6F175D3DCCD1}">
-              <a14:hiddenFill xmlns:a14="http://schemas.microsoft.com/office/drawing/2010/main" xmlns="">
+              <a14:hiddenFill xmlns="" xmlns:a14="http://schemas.microsoft.com/office/drawing/2010/main">
                 <a:solidFill>
                   <a:schemeClr val="accent1"/>
                 </a:solidFill>
               </a14:hiddenFill>
             </a:ext>
             <a:ext uri="{91240B29-F687-4F45-9708-019B960494DF}">
-              <a14:hiddenLine xmlns:a14="http://schemas.microsoft.com/office/drawing/2010/main" xmlns="" w="9525">
+              <a14:hiddenLine xmlns="" xmlns:a14="http://schemas.microsoft.com/office/drawing/2010/main" w="9525">
                 <a:solidFill>
                   <a:schemeClr val="tx1"/>
                 </a:solidFill>
@@ -22311,7 +22311,7 @@
               </a14:hiddenLine>
             </a:ext>
             <a:ext uri="{AF507438-7753-43E0-B8FC-AC1667EBCBE1}">
-              <a14:hiddenEffects xmlns:a14="http://schemas.microsoft.com/office/drawing/2010/main" xmlns="">
+              <a14:hiddenEffects xmlns="" xmlns:a14="http://schemas.microsoft.com/office/drawing/2010/main">
                 <a:effectLst>
                   <a:outerShdw dist="35921" dir="2700000" algn="ctr" rotWithShape="0">
                     <a:schemeClr val="bg2"/>
@@ -22381,7 +22381,7 @@
           <a:effectLst/>
           <a:extLst>
             <a:ext uri="{AF507438-7753-43E0-B8FC-AC1667EBCBE1}">
-              <a14:hiddenEffects xmlns:a14="http://schemas.microsoft.com/office/drawing/2010/main" xmlns="">
+              <a14:hiddenEffects xmlns="" xmlns:a14="http://schemas.microsoft.com/office/drawing/2010/main">
                 <a:effectLst>
                   <a:outerShdw dist="35921" dir="2700000" algn="ctr" rotWithShape="0">
                     <a:schemeClr val="bg2"/>
@@ -22433,7 +22433,7 @@
           <a:effectLst/>
           <a:extLst>
             <a:ext uri="{AF507438-7753-43E0-B8FC-AC1667EBCBE1}">
-              <a14:hiddenEffects xmlns:a14="http://schemas.microsoft.com/office/drawing/2010/main" xmlns="">
+              <a14:hiddenEffects xmlns="" xmlns:a14="http://schemas.microsoft.com/office/drawing/2010/main">
                 <a:effectLst>
                   <a:outerShdw dist="35921" dir="2700000" algn="ctr" rotWithShape="0">
                     <a:schemeClr val="bg2"/>
@@ -22472,7 +22472,7 @@
     <p:sldLayoutId id="2147483663" r:id="rId15"/>
   </p:sldLayoutIdLst>
   <mc:AlternateContent xmlns:mc="http://schemas.openxmlformats.org/markup-compatibility/2006">
-    <mc:Choice xmlns:p14="http://schemas.microsoft.com/office/powerpoint/2010/main" xmlns="" Requires="p14">
+    <mc:Choice xmlns="" xmlns:p14="http://schemas.microsoft.com/office/powerpoint/2010/main" Requires="p14">
       <p:transition p14:dur="10"/>
     </mc:Choice>
     <mc:Fallback>
@@ -24190,7 +24190,7 @@
               <a:t>的秘诀</a:t>
             </a:r>
             <a:r>
-              <a:rPr lang="en-US" altLang="zh-CN" sz="5400" dirty="0" smtClean="0">
+              <a:rPr lang="en-US" altLang="zh-CN" sz="5400" smtClean="0">
                 <a:solidFill>
                   <a:srgbClr val="0070C0"/>
                 </a:solidFill>
@@ -24199,7 +24199,7 @@
               <a:t/>
             </a:r>
             <a:br>
-              <a:rPr lang="en-US" altLang="zh-CN" sz="5400" dirty="0" smtClean="0">
+              <a:rPr lang="en-US" altLang="zh-CN" sz="5400" smtClean="0">
                 <a:solidFill>
                   <a:srgbClr val="0070C0"/>
                 </a:solidFill>
@@ -24207,13 +24207,13 @@
               </a:rPr>
             </a:br>
             <a:r>
-              <a:rPr lang="en-US" altLang="zh-CN" sz="2400" dirty="0" smtClean="0">
+              <a:rPr lang="en-US" altLang="zh-CN" sz="2400" smtClean="0">
                 <a:solidFill>
                   <a:srgbClr val="0070C0"/>
                 </a:solidFill>
                 <a:ea typeface="宋体" charset="-122"/>
               </a:rPr>
-              <a:t>2017-8-13</a:t>
+              <a:t>2017-10-8</a:t>
             </a:r>
             <a:endParaRPr lang="en-US" altLang="zh-CN" sz="5400" dirty="0">
               <a:solidFill>
@@ -24230,7 +24230,7 @@
     <a:masterClrMapping/>
   </p:clrMapOvr>
   <mc:AlternateContent xmlns:mc="http://schemas.openxmlformats.org/markup-compatibility/2006">
-    <mc:Choice xmlns:p14="http://schemas.microsoft.com/office/powerpoint/2010/main" xmlns="" Requires="p14">
+    <mc:Choice xmlns="" xmlns:p14="http://schemas.microsoft.com/office/powerpoint/2010/main" Requires="p14">
       <p:transition p14:dur="10"/>
     </mc:Choice>
     <mc:Fallback>
@@ -24646,7 +24646,7 @@
     </p:spTree>
     <p:extLst>
       <p:ext uri="{BB962C8B-B14F-4D97-AF65-F5344CB8AC3E}">
-        <p14:creationId xmlns:p14="http://schemas.microsoft.com/office/powerpoint/2010/main" xmlns="" val="602482599"/>
+        <p14:creationId xmlns="" xmlns:p14="http://schemas.microsoft.com/office/powerpoint/2010/main" val="602482599"/>
       </p:ext>
     </p:extLst>
   </p:cSld>
@@ -24654,7 +24654,7 @@
     <a:masterClrMapping/>
   </p:clrMapOvr>
   <mc:AlternateContent xmlns:mc="http://schemas.openxmlformats.org/markup-compatibility/2006">
-    <mc:Choice xmlns:p14="http://schemas.microsoft.com/office/powerpoint/2010/main" xmlns="" Requires="p14">
+    <mc:Choice xmlns="" xmlns:p14="http://schemas.microsoft.com/office/powerpoint/2010/main" Requires="p14">
       <p:transition p14:dur="10"/>
     </mc:Choice>
     <mc:Fallback>
@@ -24786,23 +24786,7 @@
             </a:r>
             <a:r>
               <a:rPr lang="zh-CN" altLang="en-US" dirty="0" smtClean="0"/>
-              <a:t>福音</a:t>
-            </a:r>
-            <a:r>
-              <a:rPr lang="zh-CN" altLang="en-US" dirty="0" smtClean="0"/>
-              <a:t>带</a:t>
-            </a:r>
-            <a:r>
-              <a:rPr lang="zh-CN" altLang="en-US" dirty="0" smtClean="0"/>
-              <a:t>出的盼望</a:t>
-            </a:r>
-            <a:r>
-              <a:rPr lang="zh-CN" altLang="en-US" dirty="0" smtClean="0"/>
-              <a:t> </a:t>
-            </a:r>
-            <a:r>
-              <a:rPr lang="zh-CN" altLang="en-US" dirty="0" smtClean="0"/>
-              <a:t>（</a:t>
+              <a:t>福音带出的盼望 （</a:t>
             </a:r>
             <a:r>
               <a:rPr lang="en-US" altLang="zh-CN" dirty="0" smtClean="0"/>
@@ -24854,15 +24838,7 @@
             </a:r>
             <a:r>
               <a:rPr lang="zh-CN" altLang="en-US" dirty="0" smtClean="0"/>
-              <a:t>）复活</a:t>
-            </a:r>
-            <a:r>
-              <a:rPr lang="zh-CN" altLang="en-US" dirty="0" smtClean="0"/>
-              <a:t>与做</a:t>
-            </a:r>
-            <a:r>
-              <a:rPr lang="zh-CN" altLang="en-US" dirty="0" smtClean="0"/>
-              <a:t>王的盼望（</a:t>
+              <a:t>）复活与做王的盼望（</a:t>
             </a:r>
             <a:r>
               <a:rPr lang="en-US" altLang="zh-CN" dirty="0" smtClean="0"/>
@@ -24896,7 +24872,7 @@
     </p:spTree>
     <p:extLst>
       <p:ext uri="{BB962C8B-B14F-4D97-AF65-F5344CB8AC3E}">
-        <p14:creationId xmlns:p14="http://schemas.microsoft.com/office/powerpoint/2010/main" xmlns="" val="602482599"/>
+        <p14:creationId xmlns="" xmlns:p14="http://schemas.microsoft.com/office/powerpoint/2010/main" val="602482599"/>
       </p:ext>
     </p:extLst>
   </p:cSld>
@@ -24904,7 +24880,7 @@
     <a:masterClrMapping/>
   </p:clrMapOvr>
   <mc:AlternateContent xmlns:mc="http://schemas.openxmlformats.org/markup-compatibility/2006">
-    <mc:Choice xmlns:p14="http://schemas.microsoft.com/office/powerpoint/2010/main" xmlns="" Requires="p14">
+    <mc:Choice xmlns="" xmlns:p14="http://schemas.microsoft.com/office/powerpoint/2010/main" Requires="p14">
       <p:transition p14:dur="10"/>
     </mc:Choice>
     <mc:Fallback>
@@ -24988,11 +24964,7 @@
             <a:pPr lvl="1"/>
             <a:r>
               <a:rPr lang="zh-CN" altLang="en-US" sz="2400" dirty="0" smtClean="0"/>
-              <a:t>回顾：保罗迫切盼望提摩太能够快速成长起来，继承保罗的使命。保罗的这份期盼，也代表神对我们的期望。这次我们分享</a:t>
-            </a:r>
-            <a:r>
-              <a:rPr lang="zh-CN" altLang="en-US" sz="2400" dirty="0" smtClean="0"/>
-              <a:t>了以下三点：</a:t>
+              <a:t>回顾：保罗迫切盼望提摩太能够快速成长起来，继承保罗的使命。保罗的这份期盼，也代表神对我们的期望。这次我们分享了以下三点：</a:t>
             </a:r>
             <a:endParaRPr lang="en-US" altLang="zh-CN" sz="2400" dirty="0" smtClean="0"/>
           </a:p>
@@ -25012,23 +24984,7 @@
                   <a:srgbClr val="0070C0"/>
                 </a:solidFill>
               </a:rPr>
-              <a:t>被</a:t>
-            </a:r>
-            <a:r>
-              <a:rPr lang="zh-CN" altLang="en-US" sz="2000" dirty="0" smtClean="0">
-                <a:solidFill>
-                  <a:srgbClr val="0070C0"/>
-                </a:solidFill>
-              </a:rPr>
-              <a:t>主刚强得着成长的</a:t>
-            </a:r>
-            <a:r>
-              <a:rPr lang="zh-CN" altLang="en-US" sz="2000" dirty="0" smtClean="0">
-                <a:solidFill>
-                  <a:srgbClr val="0070C0"/>
-                </a:solidFill>
-              </a:rPr>
-              <a:t>动力</a:t>
+              <a:t>被主刚强得着成长的动力</a:t>
             </a:r>
             <a:endParaRPr lang="en-US" altLang="zh-CN" sz="2000" dirty="0" smtClean="0">
               <a:solidFill>
@@ -25052,15 +25008,7 @@
                   <a:srgbClr val="0070C0"/>
                 </a:solidFill>
               </a:rPr>
-              <a:t>）靠神的话胜过成长的</a:t>
-            </a:r>
-            <a:r>
-              <a:rPr lang="zh-CN" altLang="en-US" sz="2000" dirty="0" smtClean="0">
-                <a:solidFill>
-                  <a:srgbClr val="0070C0"/>
-                </a:solidFill>
-              </a:rPr>
-              <a:t>苦难</a:t>
+              <a:t>）靠神的话胜过成长的苦难</a:t>
             </a:r>
             <a:endParaRPr lang="en-US" altLang="zh-CN" sz="2000" dirty="0" smtClean="0">
               <a:solidFill>
@@ -25096,11 +25044,7 @@
             <a:pPr lvl="1"/>
             <a:r>
               <a:rPr lang="zh-CN" altLang="en-US" sz="2400" dirty="0" smtClean="0"/>
-              <a:t>应用</a:t>
-            </a:r>
-            <a:r>
-              <a:rPr lang="zh-CN" altLang="en-US" sz="2400" dirty="0" smtClean="0"/>
-              <a:t>和反思：</a:t>
+              <a:t>应用和反思：</a:t>
             </a:r>
             <a:endParaRPr lang="en-US" altLang="zh-CN" sz="2400" dirty="0"/>
           </a:p>
@@ -25142,11 +25086,7 @@
             </a:r>
             <a:r>
               <a:rPr lang="zh-CN" altLang="en-US" sz="2000" dirty="0" smtClean="0"/>
-              <a:t>）福音在我身上发生了什么果效</a:t>
-            </a:r>
-            <a:r>
-              <a:rPr lang="zh-CN" altLang="en-US" sz="2000" dirty="0" smtClean="0"/>
-              <a:t>？对将来属灵生命成长有怎样的憧憬？</a:t>
+              <a:t>）福音在我身上发生了什么果效？对将来属灵生命成长有怎样的憧憬？</a:t>
             </a:r>
             <a:endParaRPr lang="en-US" altLang="zh-CN" dirty="0"/>
           </a:p>
@@ -25161,7 +25101,7 @@
     </p:spTree>
     <p:extLst>
       <p:ext uri="{BB962C8B-B14F-4D97-AF65-F5344CB8AC3E}">
-        <p14:creationId xmlns:p14="http://schemas.microsoft.com/office/powerpoint/2010/main" xmlns="" val="274900122"/>
+        <p14:creationId xmlns="" xmlns:p14="http://schemas.microsoft.com/office/powerpoint/2010/main" val="274900122"/>
       </p:ext>
     </p:extLst>
   </p:cSld>
@@ -25169,7 +25109,7 @@
     <a:masterClrMapping/>
   </p:clrMapOvr>
   <mc:AlternateContent xmlns:mc="http://schemas.openxmlformats.org/markup-compatibility/2006">
-    <mc:Choice xmlns:p14="http://schemas.microsoft.com/office/powerpoint/2010/main" xmlns="" Requires="p14">
+    <mc:Choice xmlns="" xmlns:p14="http://schemas.microsoft.com/office/powerpoint/2010/main" Requires="p14">
       <p:transition p14:dur="10"/>
     </mc:Choice>
     <mc:Fallback>
@@ -25283,7 +25223,7 @@
     <a:masterClrMapping/>
   </p:clrMapOvr>
   <mc:AlternateContent xmlns:mc="http://schemas.openxmlformats.org/markup-compatibility/2006">
-    <mc:Choice xmlns:p14="http://schemas.microsoft.com/office/powerpoint/2010/main" xmlns="" Requires="p14">
+    <mc:Choice xmlns="" xmlns:p14="http://schemas.microsoft.com/office/powerpoint/2010/main" Requires="p14">
       <p:transition p14:dur="10"/>
     </mc:Choice>
     <mc:Fallback>
@@ -25366,11 +25306,22 @@
           <a:p>
             <a:r>
               <a:rPr lang="zh-CN" altLang="en-US" dirty="0" smtClean="0"/>
-              <a:t>孩子</a:t>
-            </a:r>
+              <a:t>孩子成长</a:t>
+            </a:r>
+            <a:endParaRPr lang="en-US" altLang="zh-CN" dirty="0" smtClean="0"/>
+          </a:p>
+          <a:p>
+            <a:pPr lvl="1"/>
+            <a:r>
+              <a:rPr lang="zh-CN" altLang="en-US" sz="2400" dirty="0" smtClean="0"/>
+              <a:t>刚出生时长得特别快，后来变慢，全家人着急</a:t>
+            </a:r>
+            <a:endParaRPr lang="en-US" altLang="zh-CN" sz="2400" dirty="0" smtClean="0"/>
+          </a:p>
+          <a:p>
             <a:r>
               <a:rPr lang="zh-CN" altLang="en-US" dirty="0" smtClean="0"/>
-              <a:t>成长</a:t>
+              <a:t>属灵生命成长</a:t>
             </a:r>
             <a:endParaRPr lang="en-US" altLang="zh-CN" dirty="0" smtClean="0"/>
           </a:p>
@@ -25378,50 +25329,7 @@
             <a:pPr lvl="1"/>
             <a:r>
               <a:rPr lang="zh-CN" altLang="en-US" sz="2400" dirty="0" smtClean="0"/>
-              <a:t>刚出生时长得特别快，后来变慢</a:t>
-            </a:r>
-            <a:r>
-              <a:rPr lang="zh-CN" altLang="en-US" sz="2400" dirty="0" smtClean="0"/>
-              <a:t>，全家</a:t>
-            </a:r>
-            <a:r>
-              <a:rPr lang="zh-CN" altLang="en-US" sz="2400" dirty="0" smtClean="0"/>
-              <a:t>人着急</a:t>
-            </a:r>
-            <a:endParaRPr lang="en-US" altLang="zh-CN" sz="2400" dirty="0" smtClean="0"/>
-          </a:p>
-          <a:p>
-            <a:r>
-              <a:rPr lang="zh-CN" altLang="en-US" dirty="0" smtClean="0"/>
-              <a:t>属</a:t>
-            </a:r>
-            <a:r>
-              <a:rPr lang="zh-CN" altLang="en-US" dirty="0" smtClean="0"/>
-              <a:t>灵生命成长</a:t>
-            </a:r>
-            <a:endParaRPr lang="en-US" altLang="zh-CN" dirty="0" smtClean="0"/>
-          </a:p>
-          <a:p>
-            <a:pPr lvl="1"/>
-            <a:r>
-              <a:rPr lang="zh-CN" altLang="en-US" sz="2400" dirty="0" smtClean="0"/>
-              <a:t>刚信主时成长很快，慢慢原地踏步。我们</a:t>
-            </a:r>
-            <a:r>
-              <a:rPr lang="zh-CN" altLang="en-US" sz="2400" dirty="0" smtClean="0"/>
-              <a:t>的属灵生命</a:t>
-            </a:r>
-            <a:r>
-              <a:rPr lang="zh-CN" altLang="en-US" sz="2400" dirty="0" smtClean="0"/>
-              <a:t>是不是处在停滞不前</a:t>
-            </a:r>
-            <a:r>
-              <a:rPr lang="zh-CN" altLang="en-US" sz="2400" dirty="0" smtClean="0"/>
-              <a:t>的状况？我们选择任凭这种状态持续下去还是努力寻求改变</a:t>
-            </a:r>
-            <a:r>
-              <a:rPr lang="zh-CN" altLang="en-US" sz="2400" dirty="0" smtClean="0"/>
-              <a:t>？天父为我们着急！</a:t>
+              <a:t>刚信主时成长很快，慢慢原地踏步。我们的属灵生命是不是处在停滞不前的状况？我们选择任凭这种状态持续下去还是努力寻求改变？天父为我们着急！</a:t>
             </a:r>
             <a:endParaRPr lang="en-US" altLang="zh-CN" sz="2000" dirty="0">
               <a:ea typeface="宋体" charset="-122"/>
@@ -25435,7 +25343,7 @@
     <a:masterClrMapping/>
   </p:clrMapOvr>
   <mc:AlternateContent xmlns:mc="http://schemas.openxmlformats.org/markup-compatibility/2006">
-    <mc:Choice xmlns:p14="http://schemas.microsoft.com/office/powerpoint/2010/main" xmlns="" Requires="p14">
+    <mc:Choice xmlns="" xmlns:p14="http://schemas.microsoft.com/office/powerpoint/2010/main" Requires="p14">
       <p:transition p14:dur="10"/>
     </mc:Choice>
     <mc:Fallback>
@@ -25557,15 +25465,7 @@
             <a:pPr lvl="1"/>
             <a:r>
               <a:rPr lang="zh-CN" altLang="en-US" sz="2400" dirty="0" smtClean="0"/>
-              <a:t>下文</a:t>
-            </a:r>
-            <a:r>
-              <a:rPr lang="zh-CN" altLang="en-US" sz="2400" dirty="0" smtClean="0"/>
-              <a:t>第二章后半部分，生命成长起来以后学习如何为主</a:t>
-            </a:r>
-            <a:r>
-              <a:rPr lang="zh-CN" altLang="en-US" sz="2400" dirty="0" smtClean="0"/>
-              <a:t>做无愧的工人</a:t>
+              <a:t>下文第二章后半部分，生命成长起来以后学习如何为主做无愧的工人</a:t>
             </a:r>
             <a:endParaRPr lang="en-US" altLang="zh-CN" sz="2000" dirty="0" smtClean="0">
               <a:ea typeface="宋体" charset="-122"/>
@@ -25582,7 +25482,7 @@
     </p:spTree>
     <p:extLst>
       <p:ext uri="{BB962C8B-B14F-4D97-AF65-F5344CB8AC3E}">
-        <p14:creationId xmlns:p14="http://schemas.microsoft.com/office/powerpoint/2010/main" xmlns="" val="2916621134"/>
+        <p14:creationId xmlns="" xmlns:p14="http://schemas.microsoft.com/office/powerpoint/2010/main" val="2916621134"/>
       </p:ext>
     </p:extLst>
   </p:cSld>
@@ -25590,7 +25490,7 @@
     <a:masterClrMapping/>
   </p:clrMapOvr>
   <mc:AlternateContent xmlns:mc="http://schemas.openxmlformats.org/markup-compatibility/2006">
-    <mc:Choice xmlns:p14="http://schemas.microsoft.com/office/powerpoint/2010/main" xmlns="" Requires="p14">
+    <mc:Choice xmlns="" xmlns:p14="http://schemas.microsoft.com/office/powerpoint/2010/main" Requires="p14">
       <p:transition p14:dur="10"/>
     </mc:Choice>
     <mc:Fallback>
@@ -25772,11 +25672,7 @@
             </a:r>
             <a:r>
               <a:rPr lang="zh-CN" altLang="en-US" dirty="0" smtClean="0"/>
-              <a:t>）现在</a:t>
-            </a:r>
-            <a:r>
-              <a:rPr lang="zh-CN" altLang="en-US" dirty="0" smtClean="0"/>
-              <a:t>式 </a:t>
+              <a:t>）现在式 </a:t>
             </a:r>
             <a:r>
               <a:rPr lang="en-US" altLang="zh-CN" dirty="0" smtClean="0"/>
@@ -25808,11 +25704,7 @@
             </a:r>
             <a:r>
               <a:rPr lang="zh-CN" altLang="en-US" dirty="0" smtClean="0"/>
-              <a:t>）</a:t>
-            </a:r>
-            <a:r>
-              <a:rPr lang="zh-CN" altLang="en-US" dirty="0" smtClean="0"/>
-              <a:t>被动式 </a:t>
+              <a:t>）被动式 </a:t>
             </a:r>
             <a:r>
               <a:rPr lang="en-US" altLang="zh-CN" dirty="0" smtClean="0"/>
@@ -25876,11 +25768,7 @@
             </a:r>
             <a:r>
               <a:rPr lang="zh-CN" altLang="en-US" dirty="0" smtClean="0"/>
-              <a:t>）</a:t>
-            </a:r>
-            <a:r>
-              <a:rPr lang="zh-CN" altLang="en-US" dirty="0" smtClean="0"/>
-              <a:t>命令式 </a:t>
+              <a:t>）命令式 </a:t>
             </a:r>
             <a:r>
               <a:rPr lang="en-US" altLang="zh-CN" dirty="0" smtClean="0"/>
@@ -25907,7 +25795,7 @@
     </p:spTree>
     <p:extLst>
       <p:ext uri="{BB962C8B-B14F-4D97-AF65-F5344CB8AC3E}">
-        <p14:creationId xmlns:p14="http://schemas.microsoft.com/office/powerpoint/2010/main" xmlns="" val="602482599"/>
+        <p14:creationId xmlns="" xmlns:p14="http://schemas.microsoft.com/office/powerpoint/2010/main" val="602482599"/>
       </p:ext>
     </p:extLst>
   </p:cSld>
@@ -25915,7 +25803,7 @@
     <a:masterClrMapping/>
   </p:clrMapOvr>
   <mc:AlternateContent xmlns:mc="http://schemas.openxmlformats.org/markup-compatibility/2006">
-    <mc:Choice xmlns:p14="http://schemas.microsoft.com/office/powerpoint/2010/main" xmlns="" Requires="p14">
+    <mc:Choice xmlns="" xmlns:p14="http://schemas.microsoft.com/office/powerpoint/2010/main" Requires="p14">
       <p:transition p14:dur="10"/>
     </mc:Choice>
     <mc:Fallback>
@@ -26222,7 +26110,7 @@
     </p:spTree>
     <p:extLst>
       <p:ext uri="{BB962C8B-B14F-4D97-AF65-F5344CB8AC3E}">
-        <p14:creationId xmlns:p14="http://schemas.microsoft.com/office/powerpoint/2010/main" xmlns="" val="602482599"/>
+        <p14:creationId xmlns="" xmlns:p14="http://schemas.microsoft.com/office/powerpoint/2010/main" val="602482599"/>
       </p:ext>
     </p:extLst>
   </p:cSld>
@@ -26230,7 +26118,7 @@
     <a:masterClrMapping/>
   </p:clrMapOvr>
   <mc:AlternateContent xmlns:mc="http://schemas.openxmlformats.org/markup-compatibility/2006">
-    <mc:Choice xmlns:p14="http://schemas.microsoft.com/office/powerpoint/2010/main" xmlns="" Requires="p14">
+    <mc:Choice xmlns="" xmlns:p14="http://schemas.microsoft.com/office/powerpoint/2010/main" Requires="p14">
       <p:transition p14:dur="10"/>
     </mc:Choice>
     <mc:Fallback>
@@ -26547,7 +26435,7 @@
     </p:spTree>
     <p:extLst>
       <p:ext uri="{BB962C8B-B14F-4D97-AF65-F5344CB8AC3E}">
-        <p14:creationId xmlns:p14="http://schemas.microsoft.com/office/powerpoint/2010/main" xmlns="" val="602482599"/>
+        <p14:creationId xmlns="" xmlns:p14="http://schemas.microsoft.com/office/powerpoint/2010/main" val="602482599"/>
       </p:ext>
     </p:extLst>
   </p:cSld>
@@ -26555,7 +26443,7 @@
     <a:masterClrMapping/>
   </p:clrMapOvr>
   <mc:AlternateContent xmlns:mc="http://schemas.openxmlformats.org/markup-compatibility/2006">
-    <mc:Choice xmlns:p14="http://schemas.microsoft.com/office/powerpoint/2010/main" xmlns="" Requires="p14">
+    <mc:Choice xmlns="" xmlns:p14="http://schemas.microsoft.com/office/powerpoint/2010/main" Requires="p14">
       <p:transition p14:dur="10"/>
     </mc:Choice>
     <mc:Fallback>
@@ -26613,13 +26501,7 @@
               <a:rPr lang="en-US" altLang="zh-CN" sz="3600" dirty="0" smtClean="0">
                 <a:ea typeface="宋体" charset="-122"/>
               </a:rPr>
-              <a:t>2</a:t>
-            </a:r>
-            <a:r>
-              <a:rPr lang="en-US" altLang="zh-CN" sz="3600" dirty="0" smtClean="0">
-                <a:ea typeface="宋体" charset="-122"/>
-              </a:rPr>
-              <a:t>.</a:t>
+              <a:t>2.</a:t>
             </a:r>
             <a:r>
               <a:rPr lang="zh-CN" altLang="en-US" sz="3600" dirty="0" smtClean="0">
@@ -26723,15 +26605,7 @@
             </a:r>
             <a:r>
               <a:rPr lang="zh-CN" altLang="en-US" dirty="0" smtClean="0"/>
-              <a:t>成长路上必有</a:t>
-            </a:r>
-            <a:r>
-              <a:rPr lang="zh-CN" altLang="en-US" dirty="0" smtClean="0"/>
-              <a:t>苦难 </a:t>
-            </a:r>
-            <a:r>
-              <a:rPr lang="zh-CN" altLang="en-US" dirty="0" smtClean="0"/>
-              <a:t>（</a:t>
+              <a:t>成长路上必有苦难 （</a:t>
             </a:r>
             <a:r>
               <a:rPr lang="en-US" altLang="zh-CN" dirty="0" smtClean="0"/>
@@ -26821,7 +26695,7 @@
     </p:spTree>
     <p:extLst>
       <p:ext uri="{BB962C8B-B14F-4D97-AF65-F5344CB8AC3E}">
-        <p14:creationId xmlns:p14="http://schemas.microsoft.com/office/powerpoint/2010/main" xmlns="" val="602482599"/>
+        <p14:creationId xmlns="" xmlns:p14="http://schemas.microsoft.com/office/powerpoint/2010/main" val="602482599"/>
       </p:ext>
     </p:extLst>
   </p:cSld>
@@ -26829,7 +26703,7 @@
     <a:masterClrMapping/>
   </p:clrMapOvr>
   <mc:AlternateContent xmlns:mc="http://schemas.openxmlformats.org/markup-compatibility/2006">
-    <mc:Choice xmlns:p14="http://schemas.microsoft.com/office/powerpoint/2010/main" xmlns="" Requires="p14">
+    <mc:Choice xmlns="" xmlns:p14="http://schemas.microsoft.com/office/powerpoint/2010/main" Requires="p14">
       <p:transition p14:dur="10"/>
     </mc:Choice>
     <mc:Fallback>
@@ -27058,11 +26932,7 @@
             </a:r>
             <a:r>
               <a:rPr lang="zh-CN" altLang="en-US" dirty="0" smtClean="0"/>
-              <a:t>思想</a:t>
-            </a:r>
-            <a:r>
-              <a:rPr lang="zh-CN" altLang="en-US" dirty="0" smtClean="0"/>
-              <a:t>三个比喻 （</a:t>
+              <a:t>思想三个比喻 （</a:t>
             </a:r>
             <a:r>
               <a:rPr lang="en-US" altLang="zh-CN" dirty="0" smtClean="0"/>
@@ -27160,7 +27030,7 @@
     </p:spTree>
     <p:extLst>
       <p:ext uri="{BB962C8B-B14F-4D97-AF65-F5344CB8AC3E}">
-        <p14:creationId xmlns:p14="http://schemas.microsoft.com/office/powerpoint/2010/main" xmlns="" val="602482599"/>
+        <p14:creationId xmlns="" xmlns:p14="http://schemas.microsoft.com/office/powerpoint/2010/main" val="602482599"/>
       </p:ext>
     </p:extLst>
   </p:cSld>
@@ -27168,7 +27038,7 @@
     <a:masterClrMapping/>
   </p:clrMapOvr>
   <mc:AlternateContent xmlns:mc="http://schemas.openxmlformats.org/markup-compatibility/2006">
-    <mc:Choice xmlns:p14="http://schemas.microsoft.com/office/powerpoint/2010/main" xmlns="" Requires="p14">
+    <mc:Choice xmlns="" xmlns:p14="http://schemas.microsoft.com/office/powerpoint/2010/main" Requires="p14">
       <p:transition p14:dur="10"/>
     </mc:Choice>
     <mc:Fallback>
@@ -27450,7 +27320,7 @@
     </p:spTree>
     <p:extLst>
       <p:ext uri="{BB962C8B-B14F-4D97-AF65-F5344CB8AC3E}">
-        <p14:creationId xmlns:p14="http://schemas.microsoft.com/office/powerpoint/2010/main" xmlns="" val="602482599"/>
+        <p14:creationId xmlns="" xmlns:p14="http://schemas.microsoft.com/office/powerpoint/2010/main" val="602482599"/>
       </p:ext>
     </p:extLst>
   </p:cSld>
@@ -27458,7 +27328,7 @@
     <a:masterClrMapping/>
   </p:clrMapOvr>
   <mc:AlternateContent xmlns:mc="http://schemas.openxmlformats.org/markup-compatibility/2006">
-    <mc:Choice xmlns:p14="http://schemas.microsoft.com/office/powerpoint/2010/main" xmlns="" Requires="p14">
+    <mc:Choice xmlns="" xmlns:p14="http://schemas.microsoft.com/office/powerpoint/2010/main" Requires="p14">
       <p:transition p14:dur="10"/>
     </mc:Choice>
     <mc:Fallback>

</xml_diff>